<commit_message>
atualização de slides 23Ago2023
</commit_message>
<xml_diff>
--- a/01 Classes/Aula 01 Desenvolvimento Web PHP Caracterização.pptx
+++ b/01 Classes/Aula 01 Desenvolvimento Web PHP Caracterização.pptx
@@ -5,7 +5,7 @@
     <p:sldMasterId id="2147483648" r:id="rId1"/>
   </p:sldMasterIdLst>
   <p:notesMasterIdLst>
-    <p:notesMasterId r:id="rId23"/>
+    <p:notesMasterId r:id="rId24"/>
   </p:notesMasterIdLst>
   <p:sldIdLst>
     <p:sldId id="256" r:id="rId2"/>
@@ -24,11 +24,12 @@
     <p:sldId id="339" r:id="rId15"/>
     <p:sldId id="336" r:id="rId16"/>
     <p:sldId id="342" r:id="rId17"/>
-    <p:sldId id="333" r:id="rId18"/>
-    <p:sldId id="323" r:id="rId19"/>
-    <p:sldId id="334" r:id="rId20"/>
-    <p:sldId id="337" r:id="rId21"/>
-    <p:sldId id="309" r:id="rId22"/>
+    <p:sldId id="412" r:id="rId18"/>
+    <p:sldId id="333" r:id="rId19"/>
+    <p:sldId id="323" r:id="rId20"/>
+    <p:sldId id="334" r:id="rId21"/>
+    <p:sldId id="337" r:id="rId22"/>
+    <p:sldId id="309" r:id="rId23"/>
   </p:sldIdLst>
   <p:sldSz cx="9144000" cy="5143500" type="screen16x9"/>
   <p:notesSz cx="6858000" cy="9144000"/>
@@ -900,7 +901,7 @@
     </p:spTree>
     <p:extLst>
       <p:ext uri="{BB962C8B-B14F-4D97-AF65-F5344CB8AC3E}">
-        <p14:creationId xmlns:p14="http://schemas.microsoft.com/office/powerpoint/2010/main" val="585304384"/>
+        <p14:creationId xmlns:p14="http://schemas.microsoft.com/office/powerpoint/2010/main" val="3734036096"/>
       </p:ext>
     </p:extLst>
   </p:cSld>
@@ -966,7 +967,7 @@
     </p:spTree>
     <p:extLst>
       <p:ext uri="{BB962C8B-B14F-4D97-AF65-F5344CB8AC3E}">
-        <p14:creationId xmlns:p14="http://schemas.microsoft.com/office/powerpoint/2010/main" val="2709569597"/>
+        <p14:creationId xmlns:p14="http://schemas.microsoft.com/office/powerpoint/2010/main" val="585304384"/>
       </p:ext>
     </p:extLst>
   </p:cSld>
@@ -1032,6 +1033,72 @@
     </p:spTree>
     <p:extLst>
       <p:ext uri="{BB962C8B-B14F-4D97-AF65-F5344CB8AC3E}">
+        <p14:creationId xmlns:p14="http://schemas.microsoft.com/office/powerpoint/2010/main" val="2709569597"/>
+      </p:ext>
+    </p:extLst>
+  </p:cSld>
+  <p:clrMapOvr>
+    <a:masterClrMapping/>
+  </p:clrMapOvr>
+</p:notes>
+</file>
+
+<file path=ppt/notesSlides/notesSlide17.xml><?xml version="1.0" encoding="utf-8"?>
+<p:notes xmlns:a="http://schemas.openxmlformats.org/drawingml/2006/main" xmlns:r="http://schemas.openxmlformats.org/officeDocument/2006/relationships" xmlns:p="http://schemas.openxmlformats.org/presentationml/2006/main">
+  <p:cSld>
+    <p:spTree>
+      <p:nvGrpSpPr>
+        <p:cNvPr id="1" name=""/>
+        <p:cNvGrpSpPr/>
+        <p:nvPr/>
+      </p:nvGrpSpPr>
+      <p:grpSpPr>
+        <a:xfrm>
+          <a:off x="0" y="0"/>
+          <a:ext cx="0" cy="0"/>
+          <a:chOff x="0" y="0"/>
+          <a:chExt cx="0" cy="0"/>
+        </a:xfrm>
+      </p:grpSpPr>
+      <p:sp>
+        <p:nvSpPr>
+          <p:cNvPr id="2" name="Espaço Reservado para Imagem de Slide 1"/>
+          <p:cNvSpPr>
+            <a:spLocks noGrp="1" noRot="1" noChangeAspect="1"/>
+          </p:cNvSpPr>
+          <p:nvPr>
+            <p:ph type="sldImg"/>
+          </p:nvPr>
+        </p:nvSpPr>
+        <p:spPr>
+          <a:xfrm>
+            <a:off x="381000" y="685800"/>
+            <a:ext cx="6096000" cy="3429000"/>
+          </a:xfrm>
+        </p:spPr>
+      </p:sp>
+      <p:sp>
+        <p:nvSpPr>
+          <p:cNvPr id="3" name="Espaço Reservado para Anotações 2"/>
+          <p:cNvSpPr>
+            <a:spLocks noGrp="1"/>
+          </p:cNvSpPr>
+          <p:nvPr>
+            <p:ph type="body" idx="1"/>
+          </p:nvPr>
+        </p:nvSpPr>
+        <p:spPr/>
+        <p:txBody>
+          <a:bodyPr/>
+          <a:lstStyle/>
+          <a:p>
+            <a:endParaRPr lang="pt-BR" dirty="0"/>
+          </a:p>
+        </p:txBody>
+      </p:sp>
+    </p:spTree>
+    <p:extLst>
+      <p:ext uri="{BB962C8B-B14F-4D97-AF65-F5344CB8AC3E}">
         <p14:creationId xmlns:p14="http://schemas.microsoft.com/office/powerpoint/2010/main" val="2296249050"/>
       </p:ext>
     </p:extLst>
@@ -1042,7 +1109,7 @@
 </p:notes>
 </file>
 
-<file path=ppt/notesSlides/notesSlide17.xml><?xml version="1.0" encoding="utf-8"?>
+<file path=ppt/notesSlides/notesSlide18.xml><?xml version="1.0" encoding="utf-8"?>
 <p:notes xmlns:a="http://schemas.openxmlformats.org/drawingml/2006/main" xmlns:r="http://schemas.openxmlformats.org/officeDocument/2006/relationships" xmlns:p="http://schemas.openxmlformats.org/presentationml/2006/main">
   <p:cSld>
     <p:spTree>
@@ -7071,9 +7138,7 @@
           </a:xfrm>
         </p:spPr>
         <p:txBody>
-          <a:bodyPr>
-            <a:normAutofit/>
-          </a:bodyPr>
+          <a:bodyPr/>
           <a:lstStyle/>
           <a:p>
             <a:r>
@@ -7082,7 +7147,7 @@
                   <a:srgbClr val="0070C0"/>
                 </a:solidFill>
               </a:rPr>
-              <a:t>Leitura</a:t>
+              <a:t>Ambiente</a:t>
             </a:r>
             <a:r>
               <a:rPr lang="en-US" b="1" dirty="0">
@@ -7090,7 +7155,7 @@
                   <a:srgbClr val="0070C0"/>
                 </a:solidFill>
               </a:rPr>
-              <a:t> </a:t>
+              <a:t> DevOps - </a:t>
             </a:r>
             <a:r>
               <a:rPr lang="en-US" b="1" dirty="0" err="1">
@@ -7098,7 +7163,7 @@
                   <a:srgbClr val="0070C0"/>
                 </a:solidFill>
               </a:rPr>
-              <a:t>Específica</a:t>
+              <a:t>Configuração</a:t>
             </a:r>
             <a:endParaRPr lang="en-US" b="1" dirty="0">
               <a:solidFill>
@@ -7120,8 +7185,8 @@
         </p:nvSpPr>
         <p:spPr>
           <a:xfrm>
-            <a:off x="142865" y="1012261"/>
-            <a:ext cx="8865056" cy="3394472"/>
+            <a:off x="142865" y="974682"/>
+            <a:ext cx="8865056" cy="3962838"/>
           </a:xfrm>
         </p:spPr>
         <p:txBody>
@@ -7134,25 +7199,73 @@
               <a:buNone/>
             </a:pPr>
             <a:r>
-              <a:rPr lang="pt-BR" sz="1800" dirty="0">
-                <a:latin typeface="Times New Roman" panose="02020603050405020304" pitchFamily="18" charset="0"/>
-                <a:cs typeface="Times New Roman" panose="02020603050405020304" pitchFamily="18" charset="0"/>
-              </a:rPr>
-              <a:t>[1] LOUDON, Kyle. Desenvolvimento de grandes aplicações Web. Revista </a:t>
-            </a:r>
-            <a:r>
-              <a:rPr lang="pt-BR" sz="1800" dirty="0" err="1">
-                <a:latin typeface="Times New Roman" panose="02020603050405020304" pitchFamily="18" charset="0"/>
-                <a:cs typeface="Times New Roman" panose="02020603050405020304" pitchFamily="18" charset="0"/>
-              </a:rPr>
-              <a:t>Telfract</a:t>
-            </a:r>
-            <a:r>
-              <a:rPr lang="pt-BR" sz="1800" dirty="0">
-                <a:latin typeface="Times New Roman" panose="02020603050405020304" pitchFamily="18" charset="0"/>
-                <a:cs typeface="Times New Roman" panose="02020603050405020304" pitchFamily="18" charset="0"/>
-              </a:rPr>
-              <a:t>, v. 1, n. 1, 2018.</a:t>
+              <a:rPr lang="pt-BR" sz="2000" b="1" dirty="0">
+                <a:latin typeface="Times New Roman" panose="02020603050405020304" pitchFamily="18" charset="0"/>
+                <a:cs typeface="Times New Roman" panose="02020603050405020304" pitchFamily="18" charset="0"/>
+              </a:rPr>
+              <a:t>IDE - </a:t>
+            </a:r>
+            <a:r>
+              <a:rPr lang="pt-BR" sz="2000" b="1" dirty="0" err="1">
+                <a:latin typeface="Times New Roman" panose="02020603050405020304" pitchFamily="18" charset="0"/>
+                <a:cs typeface="Times New Roman" panose="02020603050405020304" pitchFamily="18" charset="0"/>
+              </a:rPr>
+              <a:t>VSCode</a:t>
+            </a:r>
+            <a:r>
+              <a:rPr lang="pt-BR" sz="2000" dirty="0">
+                <a:latin typeface="Times New Roman" panose="02020603050405020304" pitchFamily="18" charset="0"/>
+                <a:cs typeface="Times New Roman" panose="02020603050405020304" pitchFamily="18" charset="0"/>
+              </a:rPr>
+              <a:t> – Download Versão ZIPADA (</a:t>
+            </a:r>
+            <a:r>
+              <a:rPr lang="pt-BR" sz="2000" b="1" dirty="0">
+                <a:solidFill>
+                  <a:srgbClr val="FF0000"/>
+                </a:solidFill>
+                <a:latin typeface="Times New Roman" panose="02020603050405020304" pitchFamily="18" charset="0"/>
+                <a:cs typeface="Times New Roman" panose="02020603050405020304" pitchFamily="18" charset="0"/>
+              </a:rPr>
+              <a:t>Descompactar</a:t>
+            </a:r>
+            <a:r>
+              <a:rPr lang="pt-BR" sz="2000" dirty="0">
+                <a:latin typeface="Times New Roman" panose="02020603050405020304" pitchFamily="18" charset="0"/>
+                <a:cs typeface="Times New Roman" panose="02020603050405020304" pitchFamily="18" charset="0"/>
+              </a:rPr>
+              <a:t>); </a:t>
+            </a:r>
+            <a:r>
+              <a:rPr lang="pt-BR" sz="2000" dirty="0" err="1">
+                <a:latin typeface="Times New Roman" panose="02020603050405020304" pitchFamily="18" charset="0"/>
+                <a:cs typeface="Times New Roman" panose="02020603050405020304" pitchFamily="18" charset="0"/>
+              </a:rPr>
+              <a:t>PHPStorm</a:t>
+            </a:r>
+            <a:r>
+              <a:rPr lang="pt-BR" sz="2000" dirty="0">
+                <a:latin typeface="Times New Roman" panose="02020603050405020304" pitchFamily="18" charset="0"/>
+                <a:cs typeface="Times New Roman" panose="02020603050405020304" pitchFamily="18" charset="0"/>
+              </a:rPr>
+              <a:t> (</a:t>
+            </a:r>
+            <a:r>
+              <a:rPr lang="pt-BR" sz="2000" b="1" dirty="0" err="1">
+                <a:solidFill>
+                  <a:srgbClr val="FF0000"/>
+                </a:solidFill>
+                <a:latin typeface="Times New Roman" panose="02020603050405020304" pitchFamily="18" charset="0"/>
+                <a:cs typeface="Times New Roman" panose="02020603050405020304" pitchFamily="18" charset="0"/>
+              </a:rPr>
+              <a:t>Laravel</a:t>
+            </a:r>
+            <a:r>
+              <a:rPr lang="pt-BR" sz="2000" dirty="0">
+                <a:latin typeface="Times New Roman" panose="02020603050405020304" pitchFamily="18" charset="0"/>
+                <a:cs typeface="Times New Roman" panose="02020603050405020304" pitchFamily="18" charset="0"/>
+              </a:rPr>
+              <a:t>)</a:t>
             </a:r>
           </a:p>
           <a:p>
@@ -7160,132 +7273,454 @@
               <a:buNone/>
             </a:pPr>
             <a:r>
-              <a:rPr lang="pt-BR" sz="1800" dirty="0">
-                <a:latin typeface="Times New Roman" panose="02020603050405020304" pitchFamily="18" charset="0"/>
-                <a:cs typeface="Times New Roman" panose="02020603050405020304" pitchFamily="18" charset="0"/>
-              </a:rPr>
-              <a:t>	</a:t>
-            </a:r>
-            <a:r>
-              <a:rPr lang="pt-BR" sz="1800" b="1" dirty="0">
-                <a:latin typeface="Times New Roman" panose="02020603050405020304" pitchFamily="18" charset="0"/>
-                <a:cs typeface="Times New Roman" panose="02020603050405020304" pitchFamily="18" charset="0"/>
-              </a:rPr>
-              <a:t>Disponível em</a:t>
-            </a:r>
-            <a:r>
-              <a:rPr lang="pt-BR" sz="1800" dirty="0">
+              <a:rPr lang="pt-BR" sz="2000" b="1" dirty="0">
+                <a:latin typeface="Times New Roman" panose="02020603050405020304" pitchFamily="18" charset="0"/>
+                <a:cs typeface="Times New Roman" panose="02020603050405020304" pitchFamily="18" charset="0"/>
+              </a:rPr>
+              <a:t>IDE online</a:t>
+            </a:r>
+            <a:r>
+              <a:rPr lang="pt-BR" sz="2000" dirty="0">
                 <a:latin typeface="Times New Roman" panose="02020603050405020304" pitchFamily="18" charset="0"/>
                 <a:cs typeface="Times New Roman" panose="02020603050405020304" pitchFamily="18" charset="0"/>
               </a:rPr>
               <a:t>: </a:t>
             </a:r>
             <a:r>
-              <a:rPr lang="pt-BR" sz="1800" dirty="0">
+              <a:rPr lang="pt-BR" sz="2000" dirty="0">
                 <a:latin typeface="Times New Roman" panose="02020603050405020304" pitchFamily="18" charset="0"/>
                 <a:cs typeface="Times New Roman" panose="02020603050405020304" pitchFamily="18" charset="0"/>
                 <a:hlinkClick r:id="rId3"/>
               </a:rPr>
-              <a:t>https://telematicafractal.com.br/revista/index.php/telfract/article/view/9</a:t>
-            </a:r>
-            <a:endParaRPr lang="pt-BR" sz="1800" dirty="0">
+              <a:t>https://www.onlinegdb.com/</a:t>
+            </a:r>
+            <a:r>
+              <a:rPr lang="pt-BR" sz="2000" dirty="0">
+                <a:latin typeface="Times New Roman" panose="02020603050405020304" pitchFamily="18" charset="0"/>
+                <a:cs typeface="Times New Roman" panose="02020603050405020304" pitchFamily="18" charset="0"/>
+              </a:rPr>
+              <a:t> </a:t>
+            </a:r>
+          </a:p>
+          <a:p>
+            <a:pPr marL="514350" indent="-514350" algn="just">
+              <a:buAutoNum type="arabicPeriod"/>
+            </a:pPr>
+            <a:r>
+              <a:rPr lang="pt-BR" sz="2000" dirty="0">
+                <a:latin typeface="Times New Roman" panose="02020603050405020304" pitchFamily="18" charset="0"/>
+                <a:cs typeface="Times New Roman" panose="02020603050405020304" pitchFamily="18" charset="0"/>
+              </a:rPr>
+              <a:t>Instalar as extensões: 	</a:t>
+            </a:r>
+          </a:p>
+          <a:p>
+            <a:pPr marL="962025" lvl="1" indent="-514350" algn="just">
+              <a:buFont typeface="Wingdings" panose="05000000000000000000" pitchFamily="2" charset="2"/>
+              <a:buChar char="§"/>
+            </a:pPr>
+            <a:r>
+              <a:rPr lang="pt-BR" sz="2000" b="1" dirty="0">
+                <a:solidFill>
+                  <a:srgbClr val="00B050"/>
+                </a:solidFill>
+                <a:latin typeface="Times New Roman" panose="02020603050405020304" pitchFamily="18" charset="0"/>
+                <a:cs typeface="Times New Roman" panose="02020603050405020304" pitchFamily="18" charset="0"/>
+              </a:rPr>
+              <a:t>color </a:t>
+            </a:r>
+            <a:r>
+              <a:rPr lang="pt-BR" sz="2000" b="1" dirty="0" err="1">
+                <a:solidFill>
+                  <a:srgbClr val="00B050"/>
+                </a:solidFill>
+                <a:latin typeface="Times New Roman" panose="02020603050405020304" pitchFamily="18" charset="0"/>
+                <a:cs typeface="Times New Roman" panose="02020603050405020304" pitchFamily="18" charset="0"/>
+              </a:rPr>
+              <a:t>Highlight</a:t>
+            </a:r>
+            <a:r>
+              <a:rPr lang="pt-BR" sz="2000" b="1" dirty="0">
+                <a:solidFill>
+                  <a:srgbClr val="FF0000"/>
+                </a:solidFill>
+                <a:latin typeface="Times New Roman" panose="02020603050405020304" pitchFamily="18" charset="0"/>
+                <a:cs typeface="Times New Roman" panose="02020603050405020304" pitchFamily="18" charset="0"/>
+              </a:rPr>
+              <a:t> (CSS); </a:t>
+            </a:r>
+            <a:r>
+              <a:rPr lang="pt-BR" sz="2000" b="1" dirty="0" err="1">
+                <a:solidFill>
+                  <a:srgbClr val="002060"/>
+                </a:solidFill>
+                <a:latin typeface="Times New Roman" panose="02020603050405020304" pitchFamily="18" charset="0"/>
+                <a:cs typeface="Times New Roman" panose="02020603050405020304" pitchFamily="18" charset="0"/>
+              </a:rPr>
+              <a:t>vscode-icons</a:t>
+            </a:r>
+            <a:r>
+              <a:rPr lang="pt-BR" sz="2000" b="1" dirty="0">
+                <a:solidFill>
+                  <a:srgbClr val="FF0000"/>
+                </a:solidFill>
+                <a:latin typeface="Times New Roman" panose="02020603050405020304" pitchFamily="18" charset="0"/>
+                <a:cs typeface="Times New Roman" panose="02020603050405020304" pitchFamily="18" charset="0"/>
+              </a:rPr>
+              <a:t>; </a:t>
+            </a:r>
+            <a:r>
+              <a:rPr lang="pt-BR" sz="2000" b="1" dirty="0" err="1">
+                <a:solidFill>
+                  <a:srgbClr val="FF0000"/>
+                </a:solidFill>
+                <a:latin typeface="Times New Roman" panose="02020603050405020304" pitchFamily="18" charset="0"/>
+                <a:cs typeface="Times New Roman" panose="02020603050405020304" pitchFamily="18" charset="0"/>
+              </a:rPr>
+              <a:t>Bootstrap</a:t>
+            </a:r>
+            <a:r>
+              <a:rPr lang="pt-BR" sz="2000" b="1" dirty="0">
+                <a:solidFill>
+                  <a:srgbClr val="FF0000"/>
+                </a:solidFill>
+                <a:latin typeface="Times New Roman" panose="02020603050405020304" pitchFamily="18" charset="0"/>
+                <a:cs typeface="Times New Roman" panose="02020603050405020304" pitchFamily="18" charset="0"/>
+              </a:rPr>
+              <a:t> v4 </a:t>
+            </a:r>
+            <a:r>
+              <a:rPr lang="pt-BR" sz="2000" b="1" dirty="0" err="1">
+                <a:solidFill>
+                  <a:srgbClr val="FF0000"/>
+                </a:solidFill>
+                <a:latin typeface="Times New Roman" panose="02020603050405020304" pitchFamily="18" charset="0"/>
+                <a:cs typeface="Times New Roman" panose="02020603050405020304" pitchFamily="18" charset="0"/>
+              </a:rPr>
+              <a:t>Snippets</a:t>
+            </a:r>
+            <a:r>
+              <a:rPr lang="pt-BR" sz="2000" b="1" dirty="0">
+                <a:solidFill>
+                  <a:srgbClr val="FF0000"/>
+                </a:solidFill>
+                <a:latin typeface="Times New Roman" panose="02020603050405020304" pitchFamily="18" charset="0"/>
+                <a:cs typeface="Times New Roman" panose="02020603050405020304" pitchFamily="18" charset="0"/>
+              </a:rPr>
+              <a:t> / </a:t>
+            </a:r>
+            <a:r>
+              <a:rPr lang="pt-BR" sz="2000" b="1" dirty="0" err="1">
+                <a:solidFill>
+                  <a:srgbClr val="FF0000"/>
+                </a:solidFill>
+                <a:latin typeface="Times New Roman" panose="02020603050405020304" pitchFamily="18" charset="0"/>
+                <a:cs typeface="Times New Roman" panose="02020603050405020304" pitchFamily="18" charset="0"/>
+              </a:rPr>
+              <a:t>Font</a:t>
+            </a:r>
+            <a:endParaRPr lang="pt-BR" sz="2000" b="1" dirty="0">
+              <a:solidFill>
+                <a:srgbClr val="FF0000"/>
+              </a:solidFill>
               <a:latin typeface="Times New Roman" panose="02020603050405020304" pitchFamily="18" charset="0"/>
               <a:cs typeface="Times New Roman" panose="02020603050405020304" pitchFamily="18" charset="0"/>
             </a:endParaRPr>
           </a:p>
           <a:p>
+            <a:pPr marL="962025" lvl="1" indent="-514350" algn="just">
+              <a:buFont typeface="Wingdings" panose="05000000000000000000" pitchFamily="2" charset="2"/>
+              <a:buChar char="§"/>
+            </a:pPr>
+            <a:r>
+              <a:rPr lang="pt-BR" sz="2000" b="1" dirty="0" err="1">
+                <a:solidFill>
+                  <a:schemeClr val="tx1"/>
+                </a:solidFill>
+                <a:latin typeface="Times New Roman" panose="02020603050405020304" pitchFamily="18" charset="0"/>
+                <a:cs typeface="Times New Roman" panose="02020603050405020304" pitchFamily="18" charset="0"/>
+              </a:rPr>
+              <a:t>ESLint</a:t>
+            </a:r>
+            <a:r>
+              <a:rPr lang="pt-BR" sz="2000" b="1" dirty="0">
+                <a:solidFill>
+                  <a:srgbClr val="FF0000"/>
+                </a:solidFill>
+                <a:latin typeface="Times New Roman" panose="02020603050405020304" pitchFamily="18" charset="0"/>
+                <a:cs typeface="Times New Roman" panose="02020603050405020304" pitchFamily="18" charset="0"/>
+              </a:rPr>
+              <a:t> (Java Script); </a:t>
+            </a:r>
+          </a:p>
+          <a:p>
+            <a:pPr marL="962025" lvl="1" indent="-514350" algn="just">
+              <a:buFont typeface="Wingdings" panose="05000000000000000000" pitchFamily="2" charset="2"/>
+              <a:buChar char="§"/>
+            </a:pPr>
+            <a:r>
+              <a:rPr lang="pt-BR" sz="2000" b="1" dirty="0">
+                <a:solidFill>
+                  <a:srgbClr val="7030A0"/>
+                </a:solidFill>
+                <a:latin typeface="Times New Roman" panose="02020603050405020304" pitchFamily="18" charset="0"/>
+                <a:cs typeface="Times New Roman" panose="02020603050405020304" pitchFamily="18" charset="0"/>
+              </a:rPr>
+              <a:t>JSX HTML</a:t>
+            </a:r>
+            <a:r>
+              <a:rPr lang="pt-BR" sz="2000" b="1" dirty="0">
+                <a:solidFill>
+                  <a:srgbClr val="FF0000"/>
+                </a:solidFill>
+                <a:latin typeface="Times New Roman" panose="02020603050405020304" pitchFamily="18" charset="0"/>
+                <a:cs typeface="Times New Roman" panose="02020603050405020304" pitchFamily="18" charset="0"/>
+              </a:rPr>
+              <a:t>; </a:t>
+            </a:r>
+          </a:p>
+          <a:p>
+            <a:pPr marL="962025" lvl="1" indent="-514350" algn="just">
+              <a:buFont typeface="Wingdings" panose="05000000000000000000" pitchFamily="2" charset="2"/>
+              <a:buChar char="§"/>
+            </a:pPr>
+            <a:r>
+              <a:rPr lang="pt-BR" sz="2000" b="1" dirty="0" err="1">
+                <a:solidFill>
+                  <a:schemeClr val="accent6">
+                    <a:lumMod val="75000"/>
+                  </a:schemeClr>
+                </a:solidFill>
+                <a:latin typeface="Times New Roman" panose="02020603050405020304" pitchFamily="18" charset="0"/>
+                <a:cs typeface="Times New Roman" panose="02020603050405020304" pitchFamily="18" charset="0"/>
+              </a:rPr>
+              <a:t>IntelliCode</a:t>
+            </a:r>
+            <a:r>
+              <a:rPr lang="pt-BR" sz="2000" b="1" dirty="0">
+                <a:solidFill>
+                  <a:srgbClr val="FF0000"/>
+                </a:solidFill>
+                <a:latin typeface="Times New Roman" panose="02020603050405020304" pitchFamily="18" charset="0"/>
+                <a:cs typeface="Times New Roman" panose="02020603050405020304" pitchFamily="18" charset="0"/>
+              </a:rPr>
+              <a:t> (Visual Studio </a:t>
+            </a:r>
+            <a:r>
+              <a:rPr lang="pt-BR" sz="2000" b="1" dirty="0" err="1">
+                <a:solidFill>
+                  <a:srgbClr val="FF0000"/>
+                </a:solidFill>
+                <a:latin typeface="Times New Roman" panose="02020603050405020304" pitchFamily="18" charset="0"/>
+                <a:cs typeface="Times New Roman" panose="02020603050405020304" pitchFamily="18" charset="0"/>
+              </a:rPr>
+              <a:t>IntelliCode</a:t>
+            </a:r>
+            <a:r>
+              <a:rPr lang="pt-BR" sz="2000" b="1" dirty="0">
+                <a:solidFill>
+                  <a:srgbClr val="FF0000"/>
+                </a:solidFill>
+                <a:latin typeface="Times New Roman" panose="02020603050405020304" pitchFamily="18" charset="0"/>
+                <a:cs typeface="Times New Roman" panose="02020603050405020304" pitchFamily="18" charset="0"/>
+              </a:rPr>
+              <a:t>); </a:t>
+            </a:r>
+            <a:r>
+              <a:rPr lang="pt-BR" sz="2000" b="1" dirty="0" err="1">
+                <a:solidFill>
+                  <a:schemeClr val="accent6">
+                    <a:lumMod val="75000"/>
+                  </a:schemeClr>
+                </a:solidFill>
+                <a:latin typeface="Times New Roman" panose="02020603050405020304" pitchFamily="18" charset="0"/>
+                <a:cs typeface="Times New Roman" panose="02020603050405020304" pitchFamily="18" charset="0"/>
+              </a:rPr>
+              <a:t>Prettier</a:t>
+            </a:r>
+            <a:r>
+              <a:rPr lang="pt-BR" sz="2000" b="1" dirty="0">
+                <a:solidFill>
+                  <a:srgbClr val="FF0000"/>
+                </a:solidFill>
+                <a:latin typeface="Times New Roman" panose="02020603050405020304" pitchFamily="18" charset="0"/>
+                <a:cs typeface="Times New Roman" panose="02020603050405020304" pitchFamily="18" charset="0"/>
+              </a:rPr>
+              <a:t>(Format </a:t>
+            </a:r>
+            <a:r>
+              <a:rPr lang="pt-BR" sz="2000" b="1" dirty="0" err="1">
+                <a:solidFill>
+                  <a:srgbClr val="FF0000"/>
+                </a:solidFill>
+                <a:latin typeface="Times New Roman" panose="02020603050405020304" pitchFamily="18" charset="0"/>
+                <a:cs typeface="Times New Roman" panose="02020603050405020304" pitchFamily="18" charset="0"/>
+              </a:rPr>
+              <a:t>Code</a:t>
+            </a:r>
+            <a:r>
+              <a:rPr lang="pt-BR" sz="2000" b="1" dirty="0">
+                <a:solidFill>
+                  <a:srgbClr val="FF0000"/>
+                </a:solidFill>
+                <a:latin typeface="Times New Roman" panose="02020603050405020304" pitchFamily="18" charset="0"/>
+                <a:cs typeface="Times New Roman" panose="02020603050405020304" pitchFamily="18" charset="0"/>
+              </a:rPr>
+              <a:t>)</a:t>
+            </a:r>
+            <a:endParaRPr lang="pt-BR" sz="2000" b="1" dirty="0">
+              <a:solidFill>
+                <a:schemeClr val="accent6">
+                  <a:lumMod val="75000"/>
+                </a:schemeClr>
+              </a:solidFill>
+              <a:latin typeface="Times New Roman" panose="02020603050405020304" pitchFamily="18" charset="0"/>
+              <a:cs typeface="Times New Roman" panose="02020603050405020304" pitchFamily="18" charset="0"/>
+            </a:endParaRPr>
+          </a:p>
+          <a:p>
+            <a:pPr marL="962025" lvl="1" indent="-514350" algn="just">
+              <a:buFont typeface="Wingdings" panose="05000000000000000000" pitchFamily="2" charset="2"/>
+              <a:buChar char="§"/>
+            </a:pPr>
+            <a:r>
+              <a:rPr lang="pt-BR" sz="2000" b="1" dirty="0">
+                <a:solidFill>
+                  <a:srgbClr val="FF0000"/>
+                </a:solidFill>
+                <a:latin typeface="Times New Roman" panose="02020603050405020304" pitchFamily="18" charset="0"/>
+                <a:cs typeface="Times New Roman" panose="02020603050405020304" pitchFamily="18" charset="0"/>
+              </a:rPr>
+              <a:t>PHP </a:t>
+            </a:r>
+            <a:r>
+              <a:rPr lang="pt-BR" sz="2000" b="1" dirty="0" err="1">
+                <a:solidFill>
+                  <a:srgbClr val="FF0000"/>
+                </a:solidFill>
+                <a:latin typeface="Times New Roman" panose="02020603050405020304" pitchFamily="18" charset="0"/>
+                <a:cs typeface="Times New Roman" panose="02020603050405020304" pitchFamily="18" charset="0"/>
+              </a:rPr>
+              <a:t>Intelephense</a:t>
+            </a:r>
+            <a:r>
+              <a:rPr lang="pt-BR" sz="2000" b="1" dirty="0">
+                <a:solidFill>
+                  <a:srgbClr val="FF0000"/>
+                </a:solidFill>
+                <a:latin typeface="Times New Roman" panose="02020603050405020304" pitchFamily="18" charset="0"/>
+                <a:cs typeface="Times New Roman" panose="02020603050405020304" pitchFamily="18" charset="0"/>
+              </a:rPr>
+              <a:t>; </a:t>
+            </a:r>
+            <a:r>
+              <a:rPr lang="pt-BR" sz="2000" b="1" dirty="0">
+                <a:solidFill>
+                  <a:srgbClr val="002060"/>
+                </a:solidFill>
+                <a:latin typeface="Times New Roman" panose="02020603050405020304" pitchFamily="18" charset="0"/>
+                <a:cs typeface="Times New Roman" panose="02020603050405020304" pitchFamily="18" charset="0"/>
+              </a:rPr>
+              <a:t>@builtin </a:t>
+            </a:r>
+            <a:r>
+              <a:rPr lang="pt-BR" sz="2000" b="1" dirty="0" err="1">
+                <a:solidFill>
+                  <a:srgbClr val="002060"/>
+                </a:solidFill>
+                <a:latin typeface="Times New Roman" panose="02020603050405020304" pitchFamily="18" charset="0"/>
+                <a:cs typeface="Times New Roman" panose="02020603050405020304" pitchFamily="18" charset="0"/>
+              </a:rPr>
+              <a:t>php</a:t>
+            </a:r>
+            <a:r>
+              <a:rPr lang="pt-BR" sz="2000" b="1" dirty="0">
+                <a:solidFill>
+                  <a:srgbClr val="FF0000"/>
+                </a:solidFill>
+                <a:latin typeface="Times New Roman" panose="02020603050405020304" pitchFamily="18" charset="0"/>
+                <a:cs typeface="Times New Roman" panose="02020603050405020304" pitchFamily="18" charset="0"/>
+              </a:rPr>
+              <a:t>; PHP Server</a:t>
+            </a:r>
+          </a:p>
+          <a:p>
+            <a:pPr marL="514350" indent="-514350" algn="just">
+              <a:buAutoNum type="arabicPeriod"/>
+            </a:pPr>
+            <a:endParaRPr lang="pt-BR" sz="2000" b="1" dirty="0">
+              <a:solidFill>
+                <a:srgbClr val="FF0000"/>
+              </a:solidFill>
+              <a:latin typeface="Times New Roman" panose="02020603050405020304" pitchFamily="18" charset="0"/>
+              <a:cs typeface="Times New Roman" panose="02020603050405020304" pitchFamily="18" charset="0"/>
+            </a:endParaRPr>
+          </a:p>
+          <a:p>
             <a:pPr marL="0" indent="0" algn="just">
               <a:buNone/>
             </a:pPr>
-            <a:endParaRPr lang="pt-BR" sz="1800" dirty="0">
+            <a:r>
+              <a:rPr lang="pt-BR" sz="2000" b="1" dirty="0">
+                <a:solidFill>
+                  <a:schemeClr val="tx1"/>
+                </a:solidFill>
+                <a:latin typeface="Times New Roman" panose="02020603050405020304" pitchFamily="18" charset="0"/>
+                <a:cs typeface="Times New Roman" panose="02020603050405020304" pitchFamily="18" charset="0"/>
+              </a:rPr>
+              <a:t>Nota</a:t>
+            </a:r>
+            <a:r>
+              <a:rPr lang="pt-BR" sz="2000" b="1" dirty="0">
+                <a:solidFill>
+                  <a:srgbClr val="FF0000"/>
+                </a:solidFill>
+                <a:latin typeface="Times New Roman" panose="02020603050405020304" pitchFamily="18" charset="0"/>
+                <a:cs typeface="Times New Roman" panose="02020603050405020304" pitchFamily="18" charset="0"/>
+              </a:rPr>
+              <a:t>: </a:t>
+            </a:r>
+            <a:r>
+              <a:rPr lang="pt-BR" sz="2000" b="1" dirty="0">
+                <a:solidFill>
+                  <a:schemeClr val="accent6">
+                    <a:lumMod val="50000"/>
+                  </a:schemeClr>
+                </a:solidFill>
+                <a:latin typeface="Times New Roman" panose="02020603050405020304" pitchFamily="18" charset="0"/>
+                <a:cs typeface="Times New Roman" panose="02020603050405020304" pitchFamily="18" charset="0"/>
+              </a:rPr>
+              <a:t>Live server já instalado </a:t>
+            </a:r>
+            <a:r>
+              <a:rPr lang="pt-BR" sz="2000" b="1" dirty="0">
+                <a:solidFill>
+                  <a:srgbClr val="FF0000"/>
+                </a:solidFill>
+                <a:latin typeface="Times New Roman" panose="02020603050405020304" pitchFamily="18" charset="0"/>
+                <a:cs typeface="Times New Roman" panose="02020603050405020304" pitchFamily="18" charset="0"/>
+              </a:rPr>
+              <a:t>(servidor web).</a:t>
+            </a:r>
+          </a:p>
+          <a:p>
+            <a:pPr marL="0" indent="0" algn="just">
+              <a:buNone/>
+            </a:pPr>
+            <a:endParaRPr lang="pt-BR" sz="2000" b="1" dirty="0">
+              <a:solidFill>
+                <a:srgbClr val="FF0000"/>
+              </a:solidFill>
               <a:latin typeface="Times New Roman" panose="02020603050405020304" pitchFamily="18" charset="0"/>
               <a:cs typeface="Times New Roman" panose="02020603050405020304" pitchFamily="18" charset="0"/>
             </a:endParaRPr>
-          </a:p>
-          <a:p>
-            <a:pPr marL="0" indent="0" algn="just">
-              <a:buNone/>
-            </a:pPr>
-            <a:r>
-              <a:rPr lang="pt-BR" sz="1800" dirty="0">
-                <a:latin typeface="Times New Roman" panose="02020603050405020304" pitchFamily="18" charset="0"/>
-                <a:cs typeface="Times New Roman" panose="02020603050405020304" pitchFamily="18" charset="0"/>
-              </a:rPr>
-              <a:t>[2] MILETTO, Evandro Manara; DE CASTRO BERTAGNOLLI, Silvia. Desenvolvimento de Software II: Introdução ao Desenvolvimento Web com HTML, CSS, </a:t>
-            </a:r>
-            <a:r>
-              <a:rPr lang="pt-BR" sz="1800" dirty="0" err="1">
-                <a:latin typeface="Times New Roman" panose="02020603050405020304" pitchFamily="18" charset="0"/>
-                <a:cs typeface="Times New Roman" panose="02020603050405020304" pitchFamily="18" charset="0"/>
-              </a:rPr>
-              <a:t>JavaScript</a:t>
-            </a:r>
-            <a:r>
-              <a:rPr lang="pt-BR" sz="1800" dirty="0">
-                <a:latin typeface="Times New Roman" panose="02020603050405020304" pitchFamily="18" charset="0"/>
-                <a:cs typeface="Times New Roman" panose="02020603050405020304" pitchFamily="18" charset="0"/>
-              </a:rPr>
-              <a:t> e PHP-Eixo: Informação e Comunicação-Série </a:t>
-            </a:r>
-            <a:r>
-              <a:rPr lang="pt-BR" sz="1800" dirty="0" err="1">
-                <a:latin typeface="Times New Roman" panose="02020603050405020304" pitchFamily="18" charset="0"/>
-                <a:cs typeface="Times New Roman" panose="02020603050405020304" pitchFamily="18" charset="0"/>
-              </a:rPr>
-              <a:t>Tekne</a:t>
-            </a:r>
-            <a:r>
-              <a:rPr lang="pt-BR" sz="1800" dirty="0">
-                <a:latin typeface="Times New Roman" panose="02020603050405020304" pitchFamily="18" charset="0"/>
-                <a:cs typeface="Times New Roman" panose="02020603050405020304" pitchFamily="18" charset="0"/>
-              </a:rPr>
-              <a:t>. Bookman Editora, 2014.</a:t>
-            </a:r>
-          </a:p>
-          <a:p>
-            <a:pPr marL="0" indent="0" algn="just">
-              <a:buNone/>
-            </a:pPr>
-            <a:r>
-              <a:rPr lang="pt-BR" sz="1800" dirty="0">
-                <a:latin typeface="Times New Roman" panose="02020603050405020304" pitchFamily="18" charset="0"/>
-                <a:cs typeface="Times New Roman" panose="02020603050405020304" pitchFamily="18" charset="0"/>
-              </a:rPr>
-              <a:t>	</a:t>
-            </a:r>
-            <a:r>
-              <a:rPr lang="pt-BR" sz="1800" b="1" dirty="0">
-                <a:latin typeface="Times New Roman" panose="02020603050405020304" pitchFamily="18" charset="0"/>
-                <a:cs typeface="Times New Roman" panose="02020603050405020304" pitchFamily="18" charset="0"/>
-              </a:rPr>
-              <a:t>Disponível em</a:t>
-            </a:r>
-            <a:r>
-              <a:rPr lang="pt-BR" sz="1800" dirty="0">
-                <a:latin typeface="Times New Roman" panose="02020603050405020304" pitchFamily="18" charset="0"/>
-                <a:cs typeface="Times New Roman" panose="02020603050405020304" pitchFamily="18" charset="0"/>
-              </a:rPr>
-              <a:t>: </a:t>
-            </a:r>
-          </a:p>
-          <a:p>
-            <a:pPr marL="0" indent="0" algn="just">
-              <a:buNone/>
-            </a:pPr>
-            <a:r>
-              <a:rPr lang="pt-BR" sz="1800" dirty="0">
-                <a:latin typeface="Times New Roman" panose="02020603050405020304" pitchFamily="18" charset="0"/>
-                <a:cs typeface="Times New Roman" panose="02020603050405020304" pitchFamily="18" charset="0"/>
-              </a:rPr>
-              <a:t>		https://books.google.com.br/books?hl=pt-BR&amp;lr=&amp;id=lcLFAwAAQBAJ&amp;oi=fnd&amp;pg=PR1&amp;dq=desenvolvimento+web+HTML,+CSS,+Javascript&amp;ots=kROItA65yt&amp;sig=kgNIWnhh5BW8_BUa-CyMDsi5MeA#v=onepage&amp;q=desenvolvimento%20web%20HTML%2C%20CSS%2C%20Javascript&amp;f=false</a:t>
-            </a:r>
           </a:p>
         </p:txBody>
       </p:sp>
     </p:spTree>
     <p:extLst>
       <p:ext uri="{BB962C8B-B14F-4D97-AF65-F5344CB8AC3E}">
-        <p14:creationId xmlns:p14="http://schemas.microsoft.com/office/powerpoint/2010/main" val="3680270425"/>
+        <p14:creationId xmlns:p14="http://schemas.microsoft.com/office/powerpoint/2010/main" val="190674892"/>
       </p:ext>
     </p:extLst>
   </p:cSld>
@@ -7341,7 +7776,7 @@
                   <a:srgbClr val="0070C0"/>
                 </a:solidFill>
               </a:rPr>
-              <a:t>Aprenda</a:t>
+              <a:t>Leitura</a:t>
             </a:r>
             <a:r>
               <a:rPr lang="en-US" b="1" dirty="0">
@@ -7349,8 +7784,21 @@
                   <a:srgbClr val="0070C0"/>
                 </a:solidFill>
               </a:rPr>
-              <a:t>+</a:t>
-            </a:r>
+              <a:t> </a:t>
+            </a:r>
+            <a:r>
+              <a:rPr lang="en-US" b="1" dirty="0" err="1">
+                <a:solidFill>
+                  <a:srgbClr val="0070C0"/>
+                </a:solidFill>
+              </a:rPr>
+              <a:t>Específica</a:t>
+            </a:r>
+            <a:endParaRPr lang="en-US" b="1" dirty="0">
+              <a:solidFill>
+                <a:srgbClr val="0070C0"/>
+              </a:solidFill>
+            </a:endParaRPr>
           </a:p>
         </p:txBody>
       </p:sp>
@@ -7366,7 +7814,7 @@
         </p:nvSpPr>
         <p:spPr>
           <a:xfrm>
-            <a:off x="142865" y="1200151"/>
+            <a:off x="142865" y="1012261"/>
             <a:ext cx="8865056" cy="3394472"/>
           </a:xfrm>
         </p:spPr>
@@ -7379,37 +7827,65 @@
             <a:pPr marL="0" indent="0" algn="just">
               <a:buNone/>
             </a:pPr>
+            <a:r>
+              <a:rPr lang="pt-BR" sz="1800" dirty="0">
+                <a:latin typeface="Times New Roman" panose="02020603050405020304" pitchFamily="18" charset="0"/>
+                <a:cs typeface="Times New Roman" panose="02020603050405020304" pitchFamily="18" charset="0"/>
+              </a:rPr>
+              <a:t>[1] LOUDON, Kyle. Desenvolvimento de grandes aplicações Web. Revista </a:t>
+            </a:r>
+            <a:r>
+              <a:rPr lang="pt-BR" sz="1800" dirty="0" err="1">
+                <a:latin typeface="Times New Roman" panose="02020603050405020304" pitchFamily="18" charset="0"/>
+                <a:cs typeface="Times New Roman" panose="02020603050405020304" pitchFamily="18" charset="0"/>
+              </a:rPr>
+              <a:t>Telfract</a:t>
+            </a:r>
+            <a:r>
+              <a:rPr lang="pt-BR" sz="1800" dirty="0">
+                <a:latin typeface="Times New Roman" panose="02020603050405020304" pitchFamily="18" charset="0"/>
+                <a:cs typeface="Times New Roman" panose="02020603050405020304" pitchFamily="18" charset="0"/>
+              </a:rPr>
+              <a:t>, v. 1, n. 1, 2018.</a:t>
+            </a:r>
+          </a:p>
+          <a:p>
+            <a:pPr marL="0" indent="0" algn="just">
+              <a:buNone/>
+            </a:pPr>
+            <a:r>
+              <a:rPr lang="pt-BR" sz="1800" dirty="0">
+                <a:latin typeface="Times New Roman" panose="02020603050405020304" pitchFamily="18" charset="0"/>
+                <a:cs typeface="Times New Roman" panose="02020603050405020304" pitchFamily="18" charset="0"/>
+              </a:rPr>
+              <a:t>	</a:t>
+            </a:r>
+            <a:r>
+              <a:rPr lang="pt-BR" sz="1800" b="1" dirty="0">
+                <a:latin typeface="Times New Roman" panose="02020603050405020304" pitchFamily="18" charset="0"/>
+                <a:cs typeface="Times New Roman" panose="02020603050405020304" pitchFamily="18" charset="0"/>
+              </a:rPr>
+              <a:t>Disponível em</a:t>
+            </a:r>
+            <a:r>
+              <a:rPr lang="pt-BR" sz="1800" dirty="0">
+                <a:latin typeface="Times New Roman" panose="02020603050405020304" pitchFamily="18" charset="0"/>
+                <a:cs typeface="Times New Roman" panose="02020603050405020304" pitchFamily="18" charset="0"/>
+              </a:rPr>
+              <a:t>: </a:t>
+            </a:r>
+            <a:r>
+              <a:rPr lang="pt-BR" sz="1800" dirty="0">
+                <a:latin typeface="Times New Roman" panose="02020603050405020304" pitchFamily="18" charset="0"/>
+                <a:cs typeface="Times New Roman" panose="02020603050405020304" pitchFamily="18" charset="0"/>
+                <a:hlinkClick r:id="rId3"/>
+              </a:rPr>
+              <a:t>https://telematicafractal.com.br/revista/index.php/telfract/article/view/9</a:t>
+            </a:r>
             <a:endParaRPr lang="pt-BR" sz="1800" dirty="0">
               <a:latin typeface="Times New Roman" panose="02020603050405020304" pitchFamily="18" charset="0"/>
               <a:cs typeface="Times New Roman" panose="02020603050405020304" pitchFamily="18" charset="0"/>
             </a:endParaRPr>
-          </a:p>
-          <a:p>
-            <a:pPr marL="0" indent="0" algn="just">
-              <a:buNone/>
-            </a:pPr>
-            <a:r>
-              <a:rPr lang="pt-BR" sz="1800" dirty="0">
-                <a:latin typeface="Times New Roman" panose="02020603050405020304" pitchFamily="18" charset="0"/>
-                <a:cs typeface="Times New Roman" panose="02020603050405020304" pitchFamily="18" charset="0"/>
-              </a:rPr>
-              <a:t>[1] </a:t>
-            </a:r>
-            <a:r>
-              <a:rPr lang="pt-BR" sz="1800" dirty="0">
-                <a:latin typeface="Times New Roman" panose="02020603050405020304" pitchFamily="18" charset="0"/>
-                <a:cs typeface="Times New Roman" panose="02020603050405020304" pitchFamily="18" charset="0"/>
-                <a:hlinkClick r:id="rId3"/>
-              </a:rPr>
-              <a:t>https://www.w3schools.com/tags/tag_hn.asp</a:t>
-            </a:r>
-            <a:r>
-              <a:rPr lang="pt-BR" sz="1800" dirty="0">
-                <a:latin typeface="Times New Roman" panose="02020603050405020304" pitchFamily="18" charset="0"/>
-                <a:cs typeface="Times New Roman" panose="02020603050405020304" pitchFamily="18" charset="0"/>
-              </a:rPr>
-              <a:t> (HTML, CSS, JS, PHP)</a:t>
-            </a:r>
           </a:p>
           <a:p>
             <a:pPr marL="0" indent="0" algn="just">
@@ -7429,29 +7905,62 @@
                 <a:latin typeface="Times New Roman" panose="02020603050405020304" pitchFamily="18" charset="0"/>
                 <a:cs typeface="Times New Roman" panose="02020603050405020304" pitchFamily="18" charset="0"/>
               </a:rPr>
-              <a:t>[2] </a:t>
+              <a:t>[2] MILETTO, Evandro Manara; DE CASTRO BERTAGNOLLI, Silvia. Desenvolvimento de Software II: Introdução ao Desenvolvimento Web com HTML, CSS, </a:t>
+            </a:r>
+            <a:r>
+              <a:rPr lang="pt-BR" sz="1800" dirty="0" err="1">
+                <a:latin typeface="Times New Roman" panose="02020603050405020304" pitchFamily="18" charset="0"/>
+                <a:cs typeface="Times New Roman" panose="02020603050405020304" pitchFamily="18" charset="0"/>
+              </a:rPr>
+              <a:t>JavaScript</a:t>
             </a:r>
             <a:r>
               <a:rPr lang="pt-BR" sz="1800" dirty="0">
                 <a:latin typeface="Times New Roman" panose="02020603050405020304" pitchFamily="18" charset="0"/>
                 <a:cs typeface="Times New Roman" panose="02020603050405020304" pitchFamily="18" charset="0"/>
-                <a:hlinkClick r:id="rId4"/>
-              </a:rPr>
-              <a:t>https://elephantsolutions.net/best-css-frameworks-in-2021/</a:t>
-            </a:r>
-            <a:endParaRPr lang="pt-BR" sz="1800" dirty="0">
-              <a:latin typeface="Times New Roman" panose="02020603050405020304" pitchFamily="18" charset="0"/>
-              <a:cs typeface="Times New Roman" panose="02020603050405020304" pitchFamily="18" charset="0"/>
-            </a:endParaRPr>
+              </a:rPr>
+              <a:t> e PHP-Eixo: Informação e Comunicação-Série </a:t>
+            </a:r>
+            <a:r>
+              <a:rPr lang="pt-BR" sz="1800" dirty="0" err="1">
+                <a:latin typeface="Times New Roman" panose="02020603050405020304" pitchFamily="18" charset="0"/>
+                <a:cs typeface="Times New Roman" panose="02020603050405020304" pitchFamily="18" charset="0"/>
+              </a:rPr>
+              <a:t>Tekne</a:t>
+            </a:r>
+            <a:r>
+              <a:rPr lang="pt-BR" sz="1800" dirty="0">
+                <a:latin typeface="Times New Roman" panose="02020603050405020304" pitchFamily="18" charset="0"/>
+                <a:cs typeface="Times New Roman" panose="02020603050405020304" pitchFamily="18" charset="0"/>
+              </a:rPr>
+              <a:t>. Bookman Editora, 2014.</a:t>
+            </a:r>
           </a:p>
           <a:p>
             <a:pPr marL="0" indent="0" algn="just">
               <a:buNone/>
             </a:pPr>
-            <a:endParaRPr lang="pt-BR" sz="1800" dirty="0">
-              <a:latin typeface="Times New Roman" panose="02020603050405020304" pitchFamily="18" charset="0"/>
-              <a:cs typeface="Times New Roman" panose="02020603050405020304" pitchFamily="18" charset="0"/>
-            </a:endParaRPr>
+            <a:r>
+              <a:rPr lang="pt-BR" sz="1800" dirty="0">
+                <a:latin typeface="Times New Roman" panose="02020603050405020304" pitchFamily="18" charset="0"/>
+                <a:cs typeface="Times New Roman" panose="02020603050405020304" pitchFamily="18" charset="0"/>
+              </a:rPr>
+              <a:t>	</a:t>
+            </a:r>
+            <a:r>
+              <a:rPr lang="pt-BR" sz="1800" b="1" dirty="0">
+                <a:latin typeface="Times New Roman" panose="02020603050405020304" pitchFamily="18" charset="0"/>
+                <a:cs typeface="Times New Roman" panose="02020603050405020304" pitchFamily="18" charset="0"/>
+              </a:rPr>
+              <a:t>Disponível em</a:t>
+            </a:r>
+            <a:r>
+              <a:rPr lang="pt-BR" sz="1800" dirty="0">
+                <a:latin typeface="Times New Roman" panose="02020603050405020304" pitchFamily="18" charset="0"/>
+                <a:cs typeface="Times New Roman" panose="02020603050405020304" pitchFamily="18" charset="0"/>
+              </a:rPr>
+              <a:t>: </a:t>
+            </a:r>
           </a:p>
           <a:p>
             <a:pPr marL="0" indent="0" algn="just">
@@ -7462,107 +7971,15 @@
                 <a:latin typeface="Times New Roman" panose="02020603050405020304" pitchFamily="18" charset="0"/>
                 <a:cs typeface="Times New Roman" panose="02020603050405020304" pitchFamily="18" charset="0"/>
               </a:rPr>
-              <a:t>[3] </a:t>
-            </a:r>
-            <a:r>
-              <a:rPr lang="pt-BR" sz="1800" dirty="0">
-                <a:latin typeface="Times New Roman" panose="02020603050405020304" pitchFamily="18" charset="0"/>
-                <a:cs typeface="Times New Roman" panose="02020603050405020304" pitchFamily="18" charset="0"/>
-                <a:hlinkClick r:id="rId5"/>
-              </a:rPr>
-              <a:t>https://youtu.be/CTjUpZqTJDg</a:t>
-            </a:r>
-            <a:endParaRPr lang="pt-BR" sz="1800" dirty="0">
-              <a:latin typeface="Times New Roman" panose="02020603050405020304" pitchFamily="18" charset="0"/>
-              <a:cs typeface="Times New Roman" panose="02020603050405020304" pitchFamily="18" charset="0"/>
-            </a:endParaRPr>
-          </a:p>
-          <a:p>
-            <a:pPr marL="0" indent="0" algn="just">
-              <a:buNone/>
-            </a:pPr>
-            <a:endParaRPr lang="pt-BR" sz="1800" dirty="0">
-              <a:latin typeface="Times New Roman" panose="02020603050405020304" pitchFamily="18" charset="0"/>
-              <a:cs typeface="Times New Roman" panose="02020603050405020304" pitchFamily="18" charset="0"/>
-            </a:endParaRPr>
-          </a:p>
-          <a:p>
-            <a:pPr marL="0" indent="0" algn="just">
-              <a:buNone/>
-            </a:pPr>
-            <a:r>
-              <a:rPr lang="pt-BR" sz="1800" dirty="0">
-                <a:latin typeface="Times New Roman" panose="02020603050405020304" pitchFamily="18" charset="0"/>
-                <a:cs typeface="Times New Roman" panose="02020603050405020304" pitchFamily="18" charset="0"/>
-              </a:rPr>
-              <a:t>[4] </a:t>
-            </a:r>
-          </a:p>
-          <a:p>
-            <a:pPr marL="0" indent="0" algn="just">
-              <a:buNone/>
-            </a:pPr>
-            <a:r>
-              <a:rPr lang="pt-BR" sz="1800" dirty="0">
-                <a:latin typeface="Times New Roman" panose="02020603050405020304" pitchFamily="18" charset="0"/>
-                <a:cs typeface="Times New Roman" panose="02020603050405020304" pitchFamily="18" charset="0"/>
-              </a:rPr>
-              <a:t>     </a:t>
-            </a:r>
-            <a:r>
-              <a:rPr lang="pt-BR" sz="1800" dirty="0">
-                <a:latin typeface="Times New Roman" panose="02020603050405020304" pitchFamily="18" charset="0"/>
-                <a:cs typeface="Times New Roman" panose="02020603050405020304" pitchFamily="18" charset="0"/>
-                <a:hlinkClick r:id="rId6"/>
-              </a:rPr>
-              <a:t>https://developer.mozilla.org/pt</a:t>
-            </a:r>
-            <a:r>
-              <a:rPr lang="pt-BR" sz="1800" dirty="0">
-                <a:latin typeface="Times New Roman" panose="02020603050405020304" pitchFamily="18" charset="0"/>
-                <a:cs typeface="Times New Roman" panose="02020603050405020304" pitchFamily="18" charset="0"/>
-                <a:hlinkClick r:id="rId7"/>
-              </a:rPr>
-              <a:t>-BR/docs/Learn/Getting_started_with_the_web/Installing_basic_software</a:t>
-            </a:r>
-            <a:endParaRPr lang="pt-BR" sz="1800" dirty="0">
-              <a:latin typeface="Times New Roman" panose="02020603050405020304" pitchFamily="18" charset="0"/>
-              <a:cs typeface="Times New Roman" panose="02020603050405020304" pitchFamily="18" charset="0"/>
-            </a:endParaRPr>
-          </a:p>
-          <a:p>
-            <a:pPr marL="0" indent="0" algn="just">
-              <a:buNone/>
-            </a:pPr>
-            <a:endParaRPr lang="pt-BR" sz="1800" dirty="0">
-              <a:latin typeface="Times New Roman" panose="02020603050405020304" pitchFamily="18" charset="0"/>
-              <a:cs typeface="Times New Roman" panose="02020603050405020304" pitchFamily="18" charset="0"/>
-            </a:endParaRPr>
-          </a:p>
-          <a:p>
-            <a:pPr marL="0" indent="0" algn="just">
-              <a:buNone/>
-            </a:pPr>
-            <a:endParaRPr lang="pt-BR" sz="1800" dirty="0">
-              <a:latin typeface="Times New Roman" panose="02020603050405020304" pitchFamily="18" charset="0"/>
-              <a:cs typeface="Times New Roman" panose="02020603050405020304" pitchFamily="18" charset="0"/>
-            </a:endParaRPr>
-          </a:p>
-          <a:p>
-            <a:pPr marL="0" indent="0" algn="just">
-              <a:buNone/>
-            </a:pPr>
-            <a:endParaRPr lang="pt-BR" sz="1800" dirty="0">
-              <a:latin typeface="Times New Roman" panose="02020603050405020304" pitchFamily="18" charset="0"/>
-              <a:cs typeface="Times New Roman" panose="02020603050405020304" pitchFamily="18" charset="0"/>
-            </a:endParaRPr>
+              <a:t>		https://books.google.com.br/books?hl=pt-BR&amp;lr=&amp;id=lcLFAwAAQBAJ&amp;oi=fnd&amp;pg=PR1&amp;dq=desenvolvimento+web+HTML,+CSS,+Javascript&amp;ots=kROItA65yt&amp;sig=kgNIWnhh5BW8_BUa-CyMDsi5MeA#v=onepage&amp;q=desenvolvimento%20web%20HTML%2C%20CSS%2C%20Javascript&amp;f=false</a:t>
+            </a:r>
           </a:p>
         </p:txBody>
       </p:sp>
     </p:spTree>
     <p:extLst>
       <p:ext uri="{BB962C8B-B14F-4D97-AF65-F5344CB8AC3E}">
-        <p14:creationId xmlns:p14="http://schemas.microsoft.com/office/powerpoint/2010/main" val="2747596967"/>
+        <p14:creationId xmlns:p14="http://schemas.microsoft.com/office/powerpoint/2010/main" val="3680270425"/>
       </p:ext>
     </p:extLst>
   </p:cSld>
@@ -7618,7 +8035,7 @@
                   <a:srgbClr val="0070C0"/>
                 </a:solidFill>
               </a:rPr>
-              <a:t>Dinâmica</a:t>
+              <a:t>Aprenda</a:t>
             </a:r>
             <a:r>
               <a:rPr lang="en-US" b="1" dirty="0">
@@ -7626,21 +8043,8 @@
                   <a:srgbClr val="0070C0"/>
                 </a:solidFill>
               </a:rPr>
-              <a:t>/</a:t>
-            </a:r>
-            <a:r>
-              <a:rPr lang="en-US" b="1" dirty="0" err="1">
-                <a:solidFill>
-                  <a:srgbClr val="0070C0"/>
-                </a:solidFill>
-              </a:rPr>
-              <a:t>Atividades</a:t>
-            </a:r>
-            <a:endParaRPr lang="en-US" b="1" dirty="0">
-              <a:solidFill>
-                <a:srgbClr val="0070C0"/>
-              </a:solidFill>
-            </a:endParaRPr>
+              <a:t>+</a:t>
+            </a:r>
           </a:p>
         </p:txBody>
       </p:sp>
@@ -7656,8 +8060,8 @@
         </p:nvSpPr>
         <p:spPr>
           <a:xfrm>
-            <a:off x="139472" y="1063230"/>
-            <a:ext cx="8865056" cy="3606305"/>
+            <a:off x="142865" y="1200151"/>
+            <a:ext cx="8865056" cy="3394472"/>
           </a:xfrm>
         </p:spPr>
         <p:txBody>
@@ -7669,17 +8073,7 @@
             <a:pPr marL="0" indent="0" algn="just">
               <a:buNone/>
             </a:pPr>
-            <a:r>
-              <a:rPr lang="pt-BR" sz="2000" dirty="0">
-                <a:latin typeface="Times New Roman" panose="02020603050405020304" pitchFamily="18" charset="0"/>
-                <a:cs typeface="Times New Roman" panose="02020603050405020304" pitchFamily="18" charset="0"/>
-              </a:rPr>
-              <a:t>- Elabore um arquivo HTML para reproduzir o texto abaixo:</a:t>
-            </a:r>
-          </a:p>
-          <a:p>
-            <a:pPr algn="just"/>
-            <a:endParaRPr lang="pt-BR" sz="2000" dirty="0">
+            <a:endParaRPr lang="pt-BR" sz="1800" dirty="0">
               <a:latin typeface="Times New Roman" panose="02020603050405020304" pitchFamily="18" charset="0"/>
               <a:cs typeface="Times New Roman" panose="02020603050405020304" pitchFamily="18" charset="0"/>
             </a:endParaRPr>
@@ -7688,60 +8082,181 @@
             <a:pPr marL="0" indent="0" algn="just">
               <a:buNone/>
             </a:pPr>
-            <a:endParaRPr lang="pt-BR" sz="2000" dirty="0">
+            <a:r>
+              <a:rPr lang="pt-BR" sz="1800" dirty="0">
+                <a:latin typeface="Times New Roman" panose="02020603050405020304" pitchFamily="18" charset="0"/>
+                <a:cs typeface="Times New Roman" panose="02020603050405020304" pitchFamily="18" charset="0"/>
+              </a:rPr>
+              <a:t>[1] </a:t>
+            </a:r>
+            <a:r>
+              <a:rPr lang="pt-BR" sz="1800" dirty="0">
+                <a:latin typeface="Times New Roman" panose="02020603050405020304" pitchFamily="18" charset="0"/>
+                <a:cs typeface="Times New Roman" panose="02020603050405020304" pitchFamily="18" charset="0"/>
+                <a:hlinkClick r:id="rId3"/>
+              </a:rPr>
+              <a:t>https://www.w3schools.com/tags/tag_hn.asp</a:t>
+            </a:r>
+            <a:r>
+              <a:rPr lang="pt-BR" sz="1800" dirty="0">
+                <a:latin typeface="Times New Roman" panose="02020603050405020304" pitchFamily="18" charset="0"/>
+                <a:cs typeface="Times New Roman" panose="02020603050405020304" pitchFamily="18" charset="0"/>
+              </a:rPr>
+              <a:t> (HTML, CSS, JS, PHP)</a:t>
+            </a:r>
+          </a:p>
+          <a:p>
+            <a:pPr marL="0" indent="0" algn="just">
+              <a:buNone/>
+            </a:pPr>
+            <a:endParaRPr lang="pt-BR" sz="1800" dirty="0">
               <a:latin typeface="Times New Roman" panose="02020603050405020304" pitchFamily="18" charset="0"/>
               <a:cs typeface="Times New Roman" panose="02020603050405020304" pitchFamily="18" charset="0"/>
             </a:endParaRPr>
           </a:p>
           <a:p>
-            <a:pPr algn="just"/>
-            <a:endParaRPr lang="pt-BR" sz="2000" dirty="0">
+            <a:pPr marL="0" indent="0" algn="just">
+              <a:buNone/>
+            </a:pPr>
+            <a:r>
+              <a:rPr lang="pt-BR" sz="1800" dirty="0">
+                <a:latin typeface="Times New Roman" panose="02020603050405020304" pitchFamily="18" charset="0"/>
+                <a:cs typeface="Times New Roman" panose="02020603050405020304" pitchFamily="18" charset="0"/>
+              </a:rPr>
+              <a:t>[2] </a:t>
+            </a:r>
+            <a:r>
+              <a:rPr lang="pt-BR" sz="1800" dirty="0">
+                <a:latin typeface="Times New Roman" panose="02020603050405020304" pitchFamily="18" charset="0"/>
+                <a:cs typeface="Times New Roman" panose="02020603050405020304" pitchFamily="18" charset="0"/>
+                <a:hlinkClick r:id="rId4"/>
+              </a:rPr>
+              <a:t>https://elephantsolutions.net/best-css-frameworks-in-2021/</a:t>
+            </a:r>
+            <a:endParaRPr lang="pt-BR" sz="1800" dirty="0">
               <a:latin typeface="Times New Roman" panose="02020603050405020304" pitchFamily="18" charset="0"/>
               <a:cs typeface="Times New Roman" panose="02020603050405020304" pitchFamily="18" charset="0"/>
             </a:endParaRPr>
           </a:p>
           <a:p>
-            <a:pPr algn="just"/>
-            <a:endParaRPr lang="pt-BR" sz="2000" dirty="0">
-              <a:latin typeface="Calibri" panose="020F0502020204030204" pitchFamily="34" charset="0"/>
+            <a:pPr marL="0" indent="0" algn="just">
+              <a:buNone/>
+            </a:pPr>
+            <a:endParaRPr lang="pt-BR" sz="1800" dirty="0">
+              <a:latin typeface="Times New Roman" panose="02020603050405020304" pitchFamily="18" charset="0"/>
+              <a:cs typeface="Times New Roman" panose="02020603050405020304" pitchFamily="18" charset="0"/>
+            </a:endParaRPr>
+          </a:p>
+          <a:p>
+            <a:pPr marL="0" indent="0" algn="just">
+              <a:buNone/>
+            </a:pPr>
+            <a:r>
+              <a:rPr lang="pt-BR" sz="1800" dirty="0">
+                <a:latin typeface="Times New Roman" panose="02020603050405020304" pitchFamily="18" charset="0"/>
+                <a:cs typeface="Times New Roman" panose="02020603050405020304" pitchFamily="18" charset="0"/>
+              </a:rPr>
+              <a:t>[3] </a:t>
+            </a:r>
+            <a:r>
+              <a:rPr lang="pt-BR" sz="1800" dirty="0">
+                <a:latin typeface="Times New Roman" panose="02020603050405020304" pitchFamily="18" charset="0"/>
+                <a:cs typeface="Times New Roman" panose="02020603050405020304" pitchFamily="18" charset="0"/>
+                <a:hlinkClick r:id="rId5"/>
+              </a:rPr>
+              <a:t>https://youtu.be/CTjUpZqTJDg</a:t>
+            </a:r>
+            <a:endParaRPr lang="pt-BR" sz="1800" dirty="0">
+              <a:latin typeface="Times New Roman" panose="02020603050405020304" pitchFamily="18" charset="0"/>
+              <a:cs typeface="Times New Roman" panose="02020603050405020304" pitchFamily="18" charset="0"/>
+            </a:endParaRPr>
+          </a:p>
+          <a:p>
+            <a:pPr marL="0" indent="0" algn="just">
+              <a:buNone/>
+            </a:pPr>
+            <a:endParaRPr lang="pt-BR" sz="1800" dirty="0">
+              <a:latin typeface="Times New Roman" panose="02020603050405020304" pitchFamily="18" charset="0"/>
+              <a:cs typeface="Times New Roman" panose="02020603050405020304" pitchFamily="18" charset="0"/>
+            </a:endParaRPr>
+          </a:p>
+          <a:p>
+            <a:pPr marL="0" indent="0" algn="just">
+              <a:buNone/>
+            </a:pPr>
+            <a:r>
+              <a:rPr lang="pt-BR" sz="1800" dirty="0">
+                <a:latin typeface="Times New Roman" panose="02020603050405020304" pitchFamily="18" charset="0"/>
+                <a:cs typeface="Times New Roman" panose="02020603050405020304" pitchFamily="18" charset="0"/>
+              </a:rPr>
+              <a:t>[4] </a:t>
+            </a:r>
+          </a:p>
+          <a:p>
+            <a:pPr marL="0" indent="0" algn="just">
+              <a:buNone/>
+            </a:pPr>
+            <a:r>
+              <a:rPr lang="pt-BR" sz="1800" dirty="0">
+                <a:latin typeface="Times New Roman" panose="02020603050405020304" pitchFamily="18" charset="0"/>
+                <a:cs typeface="Times New Roman" panose="02020603050405020304" pitchFamily="18" charset="0"/>
+              </a:rPr>
+              <a:t>     </a:t>
+            </a:r>
+            <a:r>
+              <a:rPr lang="pt-BR" sz="1800" dirty="0">
+                <a:latin typeface="Times New Roman" panose="02020603050405020304" pitchFamily="18" charset="0"/>
+                <a:cs typeface="Times New Roman" panose="02020603050405020304" pitchFamily="18" charset="0"/>
+                <a:hlinkClick r:id="rId6"/>
+              </a:rPr>
+              <a:t>https://developer.mozilla.org/pt</a:t>
+            </a:r>
+            <a:r>
+              <a:rPr lang="pt-BR" sz="1800" dirty="0">
+                <a:latin typeface="Times New Roman" panose="02020603050405020304" pitchFamily="18" charset="0"/>
+                <a:cs typeface="Times New Roman" panose="02020603050405020304" pitchFamily="18" charset="0"/>
+                <a:hlinkClick r:id="rId7"/>
+              </a:rPr>
+              <a:t>-BR/docs/Learn/Getting_started_with_the_web/Installing_basic_software</a:t>
+            </a:r>
+            <a:endParaRPr lang="pt-BR" sz="1800" dirty="0">
+              <a:latin typeface="Times New Roman" panose="02020603050405020304" pitchFamily="18" charset="0"/>
+              <a:cs typeface="Times New Roman" panose="02020603050405020304" pitchFamily="18" charset="0"/>
+            </a:endParaRPr>
+          </a:p>
+          <a:p>
+            <a:pPr marL="0" indent="0" algn="just">
+              <a:buNone/>
+            </a:pPr>
+            <a:endParaRPr lang="pt-BR" sz="1800" dirty="0">
+              <a:latin typeface="Times New Roman" panose="02020603050405020304" pitchFamily="18" charset="0"/>
+              <a:cs typeface="Times New Roman" panose="02020603050405020304" pitchFamily="18" charset="0"/>
+            </a:endParaRPr>
+          </a:p>
+          <a:p>
+            <a:pPr marL="0" indent="0" algn="just">
+              <a:buNone/>
+            </a:pPr>
+            <a:endParaRPr lang="pt-BR" sz="1800" dirty="0">
+              <a:latin typeface="Times New Roman" panose="02020603050405020304" pitchFamily="18" charset="0"/>
+              <a:cs typeface="Times New Roman" panose="02020603050405020304" pitchFamily="18" charset="0"/>
+            </a:endParaRPr>
+          </a:p>
+          <a:p>
+            <a:pPr marL="0" indent="0" algn="just">
+              <a:buNone/>
+            </a:pPr>
+            <a:endParaRPr lang="pt-BR" sz="1800" dirty="0">
+              <a:latin typeface="Times New Roman" panose="02020603050405020304" pitchFamily="18" charset="0"/>
+              <a:cs typeface="Times New Roman" panose="02020603050405020304" pitchFamily="18" charset="0"/>
             </a:endParaRPr>
           </a:p>
         </p:txBody>
       </p:sp>
-      <p:pic>
-        <p:nvPicPr>
-          <p:cNvPr id="10" name="Imagem 9">
-            <a:extLst>
-              <a:ext uri="{FF2B5EF4-FFF2-40B4-BE49-F238E27FC236}">
-                <a16:creationId xmlns:a16="http://schemas.microsoft.com/office/drawing/2014/main" id="{B439B967-8D77-49B2-B05C-F4BE15CC78DF}"/>
-              </a:ext>
-            </a:extLst>
-          </p:cNvPr>
-          <p:cNvPicPr>
-            <a:picLocks noChangeAspect="1"/>
-          </p:cNvPicPr>
-          <p:nvPr/>
-        </p:nvPicPr>
-        <p:blipFill>
-          <a:blip r:embed="rId3"/>
-          <a:stretch>
-            <a:fillRect/>
-          </a:stretch>
-        </p:blipFill>
-        <p:spPr>
-          <a:xfrm>
-            <a:off x="574317" y="1961105"/>
-            <a:ext cx="6550908" cy="1979830"/>
-          </a:xfrm>
-          <a:prstGeom prst="rect">
-            <a:avLst/>
-          </a:prstGeom>
-        </p:spPr>
-      </p:pic>
     </p:spTree>
     <p:extLst>
       <p:ext uri="{BB962C8B-B14F-4D97-AF65-F5344CB8AC3E}">
-        <p14:creationId xmlns:p14="http://schemas.microsoft.com/office/powerpoint/2010/main" val="2470652989"/>
+        <p14:creationId xmlns:p14="http://schemas.microsoft.com/office/powerpoint/2010/main" val="2747596967"/>
       </p:ext>
     </p:extLst>
   </p:cSld>
@@ -8269,6 +8784,185 @@
                   <a:srgbClr val="0070C0"/>
                 </a:solidFill>
               </a:rPr>
+              <a:t>Dinâmica</a:t>
+            </a:r>
+            <a:r>
+              <a:rPr lang="en-US" b="1" dirty="0">
+                <a:solidFill>
+                  <a:srgbClr val="0070C0"/>
+                </a:solidFill>
+              </a:rPr>
+              <a:t>/</a:t>
+            </a:r>
+            <a:r>
+              <a:rPr lang="en-US" b="1" dirty="0" err="1">
+                <a:solidFill>
+                  <a:srgbClr val="0070C0"/>
+                </a:solidFill>
+              </a:rPr>
+              <a:t>Atividades</a:t>
+            </a:r>
+            <a:endParaRPr lang="en-US" b="1" dirty="0">
+              <a:solidFill>
+                <a:srgbClr val="0070C0"/>
+              </a:solidFill>
+            </a:endParaRPr>
+          </a:p>
+        </p:txBody>
+      </p:sp>
+      <p:sp>
+        <p:nvSpPr>
+          <p:cNvPr id="8" name="Text Placeholder 2"/>
+          <p:cNvSpPr>
+            <a:spLocks noGrp="1"/>
+          </p:cNvSpPr>
+          <p:nvPr>
+            <p:ph type="body" sz="half" idx="1"/>
+          </p:nvPr>
+        </p:nvSpPr>
+        <p:spPr>
+          <a:xfrm>
+            <a:off x="139472" y="1063230"/>
+            <a:ext cx="8865056" cy="3606305"/>
+          </a:xfrm>
+        </p:spPr>
+        <p:txBody>
+          <a:bodyPr>
+            <a:noAutofit/>
+          </a:bodyPr>
+          <a:lstStyle/>
+          <a:p>
+            <a:pPr marL="0" indent="0" algn="just">
+              <a:buNone/>
+            </a:pPr>
+            <a:r>
+              <a:rPr lang="pt-BR" sz="2000" dirty="0">
+                <a:latin typeface="Times New Roman" panose="02020603050405020304" pitchFamily="18" charset="0"/>
+                <a:cs typeface="Times New Roman" panose="02020603050405020304" pitchFamily="18" charset="0"/>
+              </a:rPr>
+              <a:t>- Elabore um arquivo HTML para reproduzir o texto abaixo:</a:t>
+            </a:r>
+          </a:p>
+          <a:p>
+            <a:pPr algn="just"/>
+            <a:endParaRPr lang="pt-BR" sz="2000" dirty="0">
+              <a:latin typeface="Times New Roman" panose="02020603050405020304" pitchFamily="18" charset="0"/>
+              <a:cs typeface="Times New Roman" panose="02020603050405020304" pitchFamily="18" charset="0"/>
+            </a:endParaRPr>
+          </a:p>
+          <a:p>
+            <a:pPr marL="0" indent="0" algn="just">
+              <a:buNone/>
+            </a:pPr>
+            <a:endParaRPr lang="pt-BR" sz="2000" dirty="0">
+              <a:latin typeface="Times New Roman" panose="02020603050405020304" pitchFamily="18" charset="0"/>
+              <a:cs typeface="Times New Roman" panose="02020603050405020304" pitchFamily="18" charset="0"/>
+            </a:endParaRPr>
+          </a:p>
+          <a:p>
+            <a:pPr algn="just"/>
+            <a:endParaRPr lang="pt-BR" sz="2000" dirty="0">
+              <a:latin typeface="Times New Roman" panose="02020603050405020304" pitchFamily="18" charset="0"/>
+              <a:cs typeface="Times New Roman" panose="02020603050405020304" pitchFamily="18" charset="0"/>
+            </a:endParaRPr>
+          </a:p>
+          <a:p>
+            <a:pPr algn="just"/>
+            <a:endParaRPr lang="pt-BR" sz="2000" dirty="0">
+              <a:latin typeface="Calibri" panose="020F0502020204030204" pitchFamily="34" charset="0"/>
+            </a:endParaRPr>
+          </a:p>
+        </p:txBody>
+      </p:sp>
+      <p:pic>
+        <p:nvPicPr>
+          <p:cNvPr id="10" name="Imagem 9">
+            <a:extLst>
+              <a:ext uri="{FF2B5EF4-FFF2-40B4-BE49-F238E27FC236}">
+                <a16:creationId xmlns:a16="http://schemas.microsoft.com/office/drawing/2014/main" id="{B439B967-8D77-49B2-B05C-F4BE15CC78DF}"/>
+              </a:ext>
+            </a:extLst>
+          </p:cNvPr>
+          <p:cNvPicPr>
+            <a:picLocks noChangeAspect="1"/>
+          </p:cNvPicPr>
+          <p:nvPr/>
+        </p:nvPicPr>
+        <p:blipFill>
+          <a:blip r:embed="rId3"/>
+          <a:stretch>
+            <a:fillRect/>
+          </a:stretch>
+        </p:blipFill>
+        <p:spPr>
+          <a:xfrm>
+            <a:off x="574317" y="1961105"/>
+            <a:ext cx="6550908" cy="1979830"/>
+          </a:xfrm>
+          <a:prstGeom prst="rect">
+            <a:avLst/>
+          </a:prstGeom>
+        </p:spPr>
+      </p:pic>
+    </p:spTree>
+    <p:extLst>
+      <p:ext uri="{BB962C8B-B14F-4D97-AF65-F5344CB8AC3E}">
+        <p14:creationId xmlns:p14="http://schemas.microsoft.com/office/powerpoint/2010/main" val="2470652989"/>
+      </p:ext>
+    </p:extLst>
+  </p:cSld>
+  <p:clrMapOvr>
+    <a:masterClrMapping/>
+  </p:clrMapOvr>
+  <p:transition spd="med"/>
+</p:sld>
+</file>
+
+<file path=ppt/slides/slide21.xml><?xml version="1.0" encoding="utf-8"?>
+<p:sld xmlns:a="http://schemas.openxmlformats.org/drawingml/2006/main" xmlns:r="http://schemas.openxmlformats.org/officeDocument/2006/relationships" xmlns:p="http://schemas.openxmlformats.org/presentationml/2006/main">
+  <p:cSld>
+    <p:spTree>
+      <p:nvGrpSpPr>
+        <p:cNvPr id="1" name=""/>
+        <p:cNvGrpSpPr/>
+        <p:nvPr/>
+      </p:nvGrpSpPr>
+      <p:grpSpPr>
+        <a:xfrm>
+          <a:off x="0" y="0"/>
+          <a:ext cx="0" cy="0"/>
+          <a:chOff x="0" y="0"/>
+          <a:chExt cx="0" cy="0"/>
+        </a:xfrm>
+      </p:grpSpPr>
+      <p:sp>
+        <p:nvSpPr>
+          <p:cNvPr id="6" name="Title 1"/>
+          <p:cNvSpPr>
+            <a:spLocks noGrp="1"/>
+          </p:cNvSpPr>
+          <p:nvPr>
+            <p:ph type="title"/>
+          </p:nvPr>
+        </p:nvSpPr>
+        <p:spPr>
+          <a:xfrm>
+            <a:off x="457200" y="205980"/>
+            <a:ext cx="8229600" cy="857251"/>
+          </a:xfrm>
+        </p:spPr>
+        <p:txBody>
+          <a:bodyPr>
+            <a:normAutofit/>
+          </a:bodyPr>
+          <a:lstStyle/>
+          <a:p>
+            <a:r>
+              <a:rPr lang="en-US" b="1" dirty="0" err="1">
+                <a:solidFill>
+                  <a:srgbClr val="0070C0"/>
+                </a:solidFill>
+              </a:rPr>
               <a:t>Referências</a:t>
             </a:r>
             <a:r>
@@ -8416,7 +9110,7 @@
 </p:sld>
 </file>
 
-<file path=ppt/slides/slide21.xml><?xml version="1.0" encoding="utf-8"?>
+<file path=ppt/slides/slide22.xml><?xml version="1.0" encoding="utf-8"?>
 <p:sld xmlns:a="http://schemas.openxmlformats.org/drawingml/2006/main" xmlns:r="http://schemas.openxmlformats.org/officeDocument/2006/relationships" xmlns:p="http://schemas.openxmlformats.org/presentationml/2006/main">
   <p:cSld>
     <p:spTree>
@@ -9106,8 +9800,8 @@
         </p:nvSpPr>
         <p:spPr>
           <a:xfrm>
-            <a:off x="142865" y="1200151"/>
-            <a:ext cx="8865056" cy="3394472"/>
+            <a:off x="142865" y="1200150"/>
+            <a:ext cx="8865056" cy="3737369"/>
           </a:xfrm>
         </p:spPr>
         <p:txBody>
@@ -9171,6 +9865,16 @@
               <a:buFont typeface="Arial" panose="020B0604020202020204" pitchFamily="34" charset="0"/>
               <a:buChar char="•"/>
             </a:pPr>
+            <a:endParaRPr lang="pt-BR" sz="2400" dirty="0">
+              <a:latin typeface="Times New Roman" panose="02020603050405020304" pitchFamily="18" charset="0"/>
+              <a:cs typeface="Times New Roman" panose="02020603050405020304" pitchFamily="18" charset="0"/>
+            </a:endParaRPr>
+          </a:p>
+          <a:p>
+            <a:pPr algn="l">
+              <a:buFont typeface="Arial" panose="020B0604020202020204" pitchFamily="34" charset="0"/>
+              <a:buChar char="•"/>
+            </a:pPr>
             <a:r>
               <a:rPr lang="pt-BR" sz="2400" b="1" dirty="0">
                 <a:latin typeface="Times New Roman" panose="02020603050405020304" pitchFamily="18" charset="0"/>
@@ -9185,6 +9889,16 @@
               </a:rPr>
               <a:t>: refere-se ao software de aplicativos.</a:t>
             </a:r>
+          </a:p>
+          <a:p>
+            <a:pPr algn="l">
+              <a:buFont typeface="Arial" panose="020B0604020202020204" pitchFamily="34" charset="0"/>
+              <a:buChar char="•"/>
+            </a:pPr>
+            <a:endParaRPr lang="pt-BR" sz="2400" dirty="0">
+              <a:latin typeface="Times New Roman" panose="02020603050405020304" pitchFamily="18" charset="0"/>
+              <a:cs typeface="Times New Roman" panose="02020603050405020304" pitchFamily="18" charset="0"/>
+            </a:endParaRPr>
           </a:p>
           <a:p>
             <a:pPr algn="l">
@@ -9318,7 +10032,7 @@
               <a:buChar char="ü"/>
             </a:pPr>
             <a:r>
-              <a:rPr lang="pt-BR" sz="2400" b="1" dirty="0">
+              <a:rPr lang="pt-BR" sz="2000" b="1" dirty="0">
                 <a:solidFill>
                   <a:srgbClr val="FF0000"/>
                 </a:solidFill>
@@ -9328,14 +10042,14 @@
               <a:t>IDE</a:t>
             </a:r>
             <a:r>
-              <a:rPr lang="pt-BR" sz="2400" dirty="0">
+              <a:rPr lang="pt-BR" sz="2000" dirty="0">
                 <a:latin typeface="Times New Roman" panose="02020603050405020304" pitchFamily="18" charset="0"/>
                 <a:cs typeface="Times New Roman" panose="02020603050405020304" pitchFamily="18" charset="0"/>
               </a:rPr>
               <a:t>: </a:t>
             </a:r>
             <a:r>
-              <a:rPr lang="pt-BR" sz="2400" b="1" dirty="0" err="1">
+              <a:rPr lang="pt-BR" sz="2000" b="1" dirty="0" err="1">
                 <a:solidFill>
                   <a:srgbClr val="0070C0"/>
                 </a:solidFill>
@@ -9345,53 +10059,39 @@
               <a:t>VSCode</a:t>
             </a:r>
             <a:r>
-              <a:rPr lang="pt-BR" sz="2400" dirty="0">
+              <a:rPr lang="pt-BR" sz="2000" dirty="0">
                 <a:latin typeface="Times New Roman" panose="02020603050405020304" pitchFamily="18" charset="0"/>
                 <a:cs typeface="Times New Roman" panose="02020603050405020304" pitchFamily="18" charset="0"/>
               </a:rPr>
               <a:t>, </a:t>
             </a:r>
             <a:r>
-              <a:rPr lang="pt-BR" sz="2400" dirty="0" err="1">
+              <a:rPr lang="pt-BR" sz="2000" dirty="0" err="1">
                 <a:latin typeface="Times New Roman" panose="02020603050405020304" pitchFamily="18" charset="0"/>
                 <a:cs typeface="Times New Roman" panose="02020603050405020304" pitchFamily="18" charset="0"/>
               </a:rPr>
               <a:t>SublimeText</a:t>
             </a:r>
             <a:r>
-              <a:rPr lang="pt-BR" sz="2400" dirty="0">
+              <a:rPr lang="pt-BR" sz="2000" dirty="0">
                 <a:latin typeface="Times New Roman" panose="02020603050405020304" pitchFamily="18" charset="0"/>
                 <a:cs typeface="Times New Roman" panose="02020603050405020304" pitchFamily="18" charset="0"/>
               </a:rPr>
               <a:t>, </a:t>
             </a:r>
             <a:r>
-              <a:rPr lang="pt-BR" sz="2400" dirty="0" err="1">
+              <a:rPr lang="pt-BR" sz="2000" dirty="0" err="1">
                 <a:latin typeface="Times New Roman" panose="02020603050405020304" pitchFamily="18" charset="0"/>
                 <a:cs typeface="Times New Roman" panose="02020603050405020304" pitchFamily="18" charset="0"/>
               </a:rPr>
               <a:t>Notepad</a:t>
             </a:r>
             <a:r>
-              <a:rPr lang="pt-BR" sz="2400" dirty="0">
-                <a:latin typeface="Times New Roman" panose="02020603050405020304" pitchFamily="18" charset="0"/>
-                <a:cs typeface="Times New Roman" panose="02020603050405020304" pitchFamily="18" charset="0"/>
-              </a:rPr>
-              <a:t>++, </a:t>
-            </a:r>
-            <a:r>
-              <a:rPr lang="pt-BR" sz="2400" dirty="0" err="1">
-                <a:latin typeface="Times New Roman" panose="02020603050405020304" pitchFamily="18" charset="0"/>
-                <a:cs typeface="Times New Roman" panose="02020603050405020304" pitchFamily="18" charset="0"/>
-              </a:rPr>
-              <a:t>Atom</a:t>
-            </a:r>
-            <a:r>
-              <a:rPr lang="pt-BR" sz="2400" dirty="0">
-                <a:latin typeface="Times New Roman" panose="02020603050405020304" pitchFamily="18" charset="0"/>
-                <a:cs typeface="Times New Roman" panose="02020603050405020304" pitchFamily="18" charset="0"/>
-              </a:rPr>
-              <a:t>, Vim, etc.</a:t>
+              <a:rPr lang="pt-BR" sz="2000" dirty="0">
+                <a:latin typeface="Times New Roman" panose="02020603050405020304" pitchFamily="18" charset="0"/>
+                <a:cs typeface="Times New Roman" panose="02020603050405020304" pitchFamily="18" charset="0"/>
+              </a:rPr>
+              <a:t>++, Atom, Vim, etc.</a:t>
             </a:r>
           </a:p>
           <a:p>
@@ -9399,7 +10099,31 @@
               <a:buFont typeface="Wingdings" panose="05000000000000000000" pitchFamily="2" charset="2"/>
               <a:buChar char="ü"/>
             </a:pPr>
-            <a:endParaRPr lang="pt-BR" sz="2400" dirty="0">
+            <a:r>
+              <a:rPr lang="pt-BR" sz="2000" b="1" dirty="0">
+                <a:solidFill>
+                  <a:srgbClr val="FF0000"/>
+                </a:solidFill>
+                <a:latin typeface="Times New Roman" panose="02020603050405020304" pitchFamily="18" charset="0"/>
+                <a:cs typeface="Times New Roman" panose="02020603050405020304" pitchFamily="18" charset="0"/>
+              </a:rPr>
+              <a:t>IDE online</a:t>
+            </a:r>
+            <a:r>
+              <a:rPr lang="pt-BR" sz="2000" dirty="0">
+                <a:latin typeface="Times New Roman" panose="02020603050405020304" pitchFamily="18" charset="0"/>
+                <a:cs typeface="Times New Roman" panose="02020603050405020304" pitchFamily="18" charset="0"/>
+              </a:rPr>
+              <a:t>: onlinegdb.com; codepen.io; playcode.io; codesandbox.io, </a:t>
+            </a:r>
+            <a:r>
+              <a:rPr lang="pt-BR" sz="2000" dirty="0" err="1">
+                <a:latin typeface="Times New Roman" panose="02020603050405020304" pitchFamily="18" charset="0"/>
+                <a:cs typeface="Times New Roman" panose="02020603050405020304" pitchFamily="18" charset="0"/>
+              </a:rPr>
+              <a:t>etc</a:t>
+            </a:r>
+            <a:endParaRPr lang="pt-BR" sz="2000" dirty="0">
               <a:latin typeface="Times New Roman" panose="02020603050405020304" pitchFamily="18" charset="0"/>
               <a:cs typeface="Times New Roman" panose="02020603050405020304" pitchFamily="18" charset="0"/>
             </a:endParaRPr>
@@ -9409,235 +10133,238 @@
               <a:buFont typeface="Wingdings" panose="05000000000000000000" pitchFamily="2" charset="2"/>
               <a:buChar char="ü"/>
             </a:pPr>
-            <a:r>
-              <a:rPr lang="pt-BR" sz="2400" b="1" dirty="0">
-                <a:solidFill>
-                  <a:srgbClr val="FF0000"/>
-                </a:solidFill>
-                <a:latin typeface="Times New Roman" panose="02020603050405020304" pitchFamily="18" charset="0"/>
-                <a:cs typeface="Times New Roman" panose="02020603050405020304" pitchFamily="18" charset="0"/>
-              </a:rPr>
-              <a:t>Servidor Web Local</a:t>
-            </a:r>
-            <a:r>
-              <a:rPr lang="pt-BR" sz="2400" dirty="0">
-                <a:latin typeface="Times New Roman" panose="02020603050405020304" pitchFamily="18" charset="0"/>
-                <a:cs typeface="Times New Roman" panose="02020603050405020304" pitchFamily="18" charset="0"/>
-              </a:rPr>
-              <a:t>: </a:t>
-            </a:r>
-            <a:r>
-              <a:rPr lang="pt-BR" sz="2400" dirty="0" err="1">
-                <a:latin typeface="Times New Roman" panose="02020603050405020304" pitchFamily="18" charset="0"/>
-                <a:cs typeface="Times New Roman" panose="02020603050405020304" pitchFamily="18" charset="0"/>
-              </a:rPr>
-              <a:t>VSCode</a:t>
-            </a:r>
-            <a:r>
-              <a:rPr lang="pt-BR" sz="2400" dirty="0">
-                <a:latin typeface="Times New Roman" panose="02020603050405020304" pitchFamily="18" charset="0"/>
-                <a:cs typeface="Times New Roman" panose="02020603050405020304" pitchFamily="18" charset="0"/>
-              </a:rPr>
-              <a:t>(</a:t>
-            </a:r>
-            <a:r>
-              <a:rPr lang="pt-BR" sz="2400" dirty="0" err="1">
-                <a:latin typeface="Times New Roman" panose="02020603050405020304" pitchFamily="18" charset="0"/>
-                <a:cs typeface="Times New Roman" panose="02020603050405020304" pitchFamily="18" charset="0"/>
-              </a:rPr>
-              <a:t>Imbutido</a:t>
-            </a:r>
-            <a:r>
-              <a:rPr lang="pt-BR" sz="2400" dirty="0">
-                <a:latin typeface="Times New Roman" panose="02020603050405020304" pitchFamily="18" charset="0"/>
-                <a:cs typeface="Times New Roman" panose="02020603050405020304" pitchFamily="18" charset="0"/>
-              </a:rPr>
-              <a:t>), Apache, etc.</a:t>
-            </a:r>
+            <a:endParaRPr lang="pt-BR" sz="2000" dirty="0">
+              <a:latin typeface="Times New Roman" panose="02020603050405020304" pitchFamily="18" charset="0"/>
+              <a:cs typeface="Times New Roman" panose="02020603050405020304" pitchFamily="18" charset="0"/>
+            </a:endParaRPr>
           </a:p>
           <a:p>
             <a:pPr algn="just">
               <a:buFont typeface="Wingdings" panose="05000000000000000000" pitchFamily="2" charset="2"/>
               <a:buChar char="ü"/>
             </a:pPr>
-            <a:endParaRPr lang="pt-BR" sz="2400" dirty="0">
-              <a:latin typeface="Times New Roman" panose="02020603050405020304" pitchFamily="18" charset="0"/>
-              <a:cs typeface="Times New Roman" panose="02020603050405020304" pitchFamily="18" charset="0"/>
-            </a:endParaRPr>
+            <a:r>
+              <a:rPr lang="pt-BR" sz="2000" b="1" dirty="0">
+                <a:solidFill>
+                  <a:srgbClr val="FF0000"/>
+                </a:solidFill>
+                <a:latin typeface="Times New Roman" panose="02020603050405020304" pitchFamily="18" charset="0"/>
+                <a:cs typeface="Times New Roman" panose="02020603050405020304" pitchFamily="18" charset="0"/>
+              </a:rPr>
+              <a:t>Servidor Web Local</a:t>
+            </a:r>
+            <a:r>
+              <a:rPr lang="pt-BR" sz="2000" dirty="0">
+                <a:latin typeface="Times New Roman" panose="02020603050405020304" pitchFamily="18" charset="0"/>
+                <a:cs typeface="Times New Roman" panose="02020603050405020304" pitchFamily="18" charset="0"/>
+              </a:rPr>
+              <a:t>: </a:t>
+            </a:r>
+            <a:r>
+              <a:rPr lang="pt-BR" sz="2000" dirty="0" err="1">
+                <a:latin typeface="Times New Roman" panose="02020603050405020304" pitchFamily="18" charset="0"/>
+                <a:cs typeface="Times New Roman" panose="02020603050405020304" pitchFamily="18" charset="0"/>
+              </a:rPr>
+              <a:t>VSCode</a:t>
+            </a:r>
+            <a:r>
+              <a:rPr lang="pt-BR" sz="2000" dirty="0">
+                <a:latin typeface="Times New Roman" panose="02020603050405020304" pitchFamily="18" charset="0"/>
+                <a:cs typeface="Times New Roman" panose="02020603050405020304" pitchFamily="18" charset="0"/>
+              </a:rPr>
+              <a:t>(</a:t>
+            </a:r>
+            <a:r>
+              <a:rPr lang="pt-BR" sz="2000" dirty="0" err="1">
+                <a:latin typeface="Times New Roman" panose="02020603050405020304" pitchFamily="18" charset="0"/>
+                <a:cs typeface="Times New Roman" panose="02020603050405020304" pitchFamily="18" charset="0"/>
+              </a:rPr>
+              <a:t>Imbutido</a:t>
+            </a:r>
+            <a:r>
+              <a:rPr lang="pt-BR" sz="2000" dirty="0">
+                <a:latin typeface="Times New Roman" panose="02020603050405020304" pitchFamily="18" charset="0"/>
+                <a:cs typeface="Times New Roman" panose="02020603050405020304" pitchFamily="18" charset="0"/>
+              </a:rPr>
+              <a:t>), Apache, etc.</a:t>
+            </a:r>
           </a:p>
           <a:p>
             <a:pPr algn="just">
               <a:buFont typeface="Wingdings" panose="05000000000000000000" pitchFamily="2" charset="2"/>
               <a:buChar char="ü"/>
             </a:pPr>
-            <a:r>
-              <a:rPr lang="pt-BR" sz="2400" b="1" dirty="0">
-                <a:solidFill>
-                  <a:srgbClr val="FF0000"/>
-                </a:solidFill>
-                <a:latin typeface="Times New Roman" panose="02020603050405020304" pitchFamily="18" charset="0"/>
-                <a:cs typeface="Times New Roman" panose="02020603050405020304" pitchFamily="18" charset="0"/>
-              </a:rPr>
-              <a:t>Navegador</a:t>
-            </a:r>
-            <a:r>
-              <a:rPr lang="pt-BR" sz="2400" dirty="0">
-                <a:latin typeface="Times New Roman" panose="02020603050405020304" pitchFamily="18" charset="0"/>
-                <a:cs typeface="Times New Roman" panose="02020603050405020304" pitchFamily="18" charset="0"/>
-              </a:rPr>
-              <a:t>: </a:t>
-            </a:r>
-            <a:r>
-              <a:rPr lang="pt-BR" sz="2400" b="1" dirty="0">
-                <a:solidFill>
-                  <a:srgbClr val="0070C0"/>
-                </a:solidFill>
-                <a:latin typeface="Times New Roman" panose="02020603050405020304" pitchFamily="18" charset="0"/>
-                <a:cs typeface="Times New Roman" panose="02020603050405020304" pitchFamily="18" charset="0"/>
-              </a:rPr>
-              <a:t>Chrome</a:t>
-            </a:r>
-            <a:r>
-              <a:rPr lang="pt-BR" sz="2400" dirty="0">
-                <a:latin typeface="Times New Roman" panose="02020603050405020304" pitchFamily="18" charset="0"/>
-                <a:cs typeface="Times New Roman" panose="02020603050405020304" pitchFamily="18" charset="0"/>
-              </a:rPr>
-              <a:t>, Firefox, </a:t>
-            </a:r>
-            <a:r>
-              <a:rPr lang="pt-BR" sz="2400" b="1" dirty="0">
-                <a:solidFill>
-                  <a:srgbClr val="0070C0"/>
-                </a:solidFill>
-                <a:latin typeface="Times New Roman" panose="02020603050405020304" pitchFamily="18" charset="0"/>
-                <a:cs typeface="Times New Roman" panose="02020603050405020304" pitchFamily="18" charset="0"/>
-              </a:rPr>
-              <a:t>Microsoft Edge</a:t>
-            </a:r>
-            <a:r>
-              <a:rPr lang="pt-BR" sz="2400" dirty="0">
-                <a:latin typeface="Times New Roman" panose="02020603050405020304" pitchFamily="18" charset="0"/>
-                <a:cs typeface="Times New Roman" panose="02020603050405020304" pitchFamily="18" charset="0"/>
-              </a:rPr>
-              <a:t>, </a:t>
-            </a:r>
-            <a:r>
-              <a:rPr lang="pt-BR" sz="2400" dirty="0" err="1">
-                <a:latin typeface="Times New Roman" panose="02020603050405020304" pitchFamily="18" charset="0"/>
-                <a:cs typeface="Times New Roman" panose="02020603050405020304" pitchFamily="18" charset="0"/>
-              </a:rPr>
-              <a:t>Brave</a:t>
-            </a:r>
-            <a:r>
-              <a:rPr lang="pt-BR" sz="2400" dirty="0">
-                <a:latin typeface="Times New Roman" panose="02020603050405020304" pitchFamily="18" charset="0"/>
-                <a:cs typeface="Times New Roman" panose="02020603050405020304" pitchFamily="18" charset="0"/>
-              </a:rPr>
-              <a:t>, etc.</a:t>
-            </a:r>
+            <a:endParaRPr lang="pt-BR" sz="2000" dirty="0">
+              <a:latin typeface="Times New Roman" panose="02020603050405020304" pitchFamily="18" charset="0"/>
+              <a:cs typeface="Times New Roman" panose="02020603050405020304" pitchFamily="18" charset="0"/>
+            </a:endParaRPr>
           </a:p>
           <a:p>
             <a:pPr algn="just">
               <a:buFont typeface="Wingdings" panose="05000000000000000000" pitchFamily="2" charset="2"/>
               <a:buChar char="ü"/>
             </a:pPr>
-            <a:endParaRPr lang="pt-BR" sz="2400" dirty="0">
-              <a:latin typeface="Times New Roman" panose="02020603050405020304" pitchFamily="18" charset="0"/>
-              <a:cs typeface="Times New Roman" panose="02020603050405020304" pitchFamily="18" charset="0"/>
-            </a:endParaRPr>
+            <a:r>
+              <a:rPr lang="pt-BR" sz="2000" b="1" dirty="0">
+                <a:solidFill>
+                  <a:srgbClr val="FF0000"/>
+                </a:solidFill>
+                <a:latin typeface="Times New Roman" panose="02020603050405020304" pitchFamily="18" charset="0"/>
+                <a:cs typeface="Times New Roman" panose="02020603050405020304" pitchFamily="18" charset="0"/>
+              </a:rPr>
+              <a:t>Navegador</a:t>
+            </a:r>
+            <a:r>
+              <a:rPr lang="pt-BR" sz="2000" dirty="0">
+                <a:latin typeface="Times New Roman" panose="02020603050405020304" pitchFamily="18" charset="0"/>
+                <a:cs typeface="Times New Roman" panose="02020603050405020304" pitchFamily="18" charset="0"/>
+              </a:rPr>
+              <a:t>: </a:t>
+            </a:r>
+            <a:r>
+              <a:rPr lang="pt-BR" sz="2000" b="1" dirty="0">
+                <a:solidFill>
+                  <a:srgbClr val="0070C0"/>
+                </a:solidFill>
+                <a:latin typeface="Times New Roman" panose="02020603050405020304" pitchFamily="18" charset="0"/>
+                <a:cs typeface="Times New Roman" panose="02020603050405020304" pitchFamily="18" charset="0"/>
+              </a:rPr>
+              <a:t>Chrome</a:t>
+            </a:r>
+            <a:r>
+              <a:rPr lang="pt-BR" sz="2000" dirty="0">
+                <a:latin typeface="Times New Roman" panose="02020603050405020304" pitchFamily="18" charset="0"/>
+                <a:cs typeface="Times New Roman" panose="02020603050405020304" pitchFamily="18" charset="0"/>
+              </a:rPr>
+              <a:t>, Firefox, </a:t>
+            </a:r>
+            <a:r>
+              <a:rPr lang="pt-BR" sz="2000" b="1" dirty="0">
+                <a:solidFill>
+                  <a:srgbClr val="0070C0"/>
+                </a:solidFill>
+                <a:latin typeface="Times New Roman" panose="02020603050405020304" pitchFamily="18" charset="0"/>
+                <a:cs typeface="Times New Roman" panose="02020603050405020304" pitchFamily="18" charset="0"/>
+              </a:rPr>
+              <a:t>Microsoft Edge</a:t>
+            </a:r>
+            <a:r>
+              <a:rPr lang="pt-BR" sz="2000" dirty="0">
+                <a:latin typeface="Times New Roman" panose="02020603050405020304" pitchFamily="18" charset="0"/>
+                <a:cs typeface="Times New Roman" panose="02020603050405020304" pitchFamily="18" charset="0"/>
+              </a:rPr>
+              <a:t>, </a:t>
+            </a:r>
+            <a:r>
+              <a:rPr lang="pt-BR" sz="2000" dirty="0" err="1">
+                <a:latin typeface="Times New Roman" panose="02020603050405020304" pitchFamily="18" charset="0"/>
+                <a:cs typeface="Times New Roman" panose="02020603050405020304" pitchFamily="18" charset="0"/>
+              </a:rPr>
+              <a:t>Brave</a:t>
+            </a:r>
+            <a:r>
+              <a:rPr lang="pt-BR" sz="2000" dirty="0">
+                <a:latin typeface="Times New Roman" panose="02020603050405020304" pitchFamily="18" charset="0"/>
+                <a:cs typeface="Times New Roman" panose="02020603050405020304" pitchFamily="18" charset="0"/>
+              </a:rPr>
+              <a:t>, etc.</a:t>
+            </a:r>
           </a:p>
           <a:p>
             <a:pPr algn="just">
               <a:buFont typeface="Wingdings" panose="05000000000000000000" pitchFamily="2" charset="2"/>
               <a:buChar char="ü"/>
             </a:pPr>
-            <a:r>
-              <a:rPr lang="pt-BR" sz="2400" b="1" dirty="0">
-                <a:solidFill>
-                  <a:srgbClr val="FF0000"/>
-                </a:solidFill>
-                <a:latin typeface="Times New Roman" panose="02020603050405020304" pitchFamily="18" charset="0"/>
-                <a:cs typeface="Times New Roman" panose="02020603050405020304" pitchFamily="18" charset="0"/>
-              </a:rPr>
-              <a:t>Repositório de Dados Remoto</a:t>
-            </a:r>
-            <a:r>
-              <a:rPr lang="pt-BR" sz="2400" dirty="0">
-                <a:latin typeface="Times New Roman" panose="02020603050405020304" pitchFamily="18" charset="0"/>
-                <a:cs typeface="Times New Roman" panose="02020603050405020304" pitchFamily="18" charset="0"/>
-              </a:rPr>
-              <a:t>: </a:t>
-            </a:r>
-            <a:r>
-              <a:rPr lang="pt-BR" sz="2400" b="1" dirty="0">
-                <a:solidFill>
-                  <a:srgbClr val="0070C0"/>
-                </a:solidFill>
-                <a:latin typeface="Times New Roman" panose="02020603050405020304" pitchFamily="18" charset="0"/>
-                <a:cs typeface="Times New Roman" panose="02020603050405020304" pitchFamily="18" charset="0"/>
-              </a:rPr>
-              <a:t>GitHub</a:t>
-            </a:r>
-            <a:r>
-              <a:rPr lang="pt-BR" sz="2400" dirty="0">
-                <a:latin typeface="Times New Roman" panose="02020603050405020304" pitchFamily="18" charset="0"/>
-                <a:cs typeface="Times New Roman" panose="02020603050405020304" pitchFamily="18" charset="0"/>
-              </a:rPr>
-              <a:t>, </a:t>
-            </a:r>
-            <a:r>
-              <a:rPr lang="pt-BR" sz="2400" dirty="0" err="1">
-                <a:latin typeface="Times New Roman" panose="02020603050405020304" pitchFamily="18" charset="0"/>
-                <a:cs typeface="Times New Roman" panose="02020603050405020304" pitchFamily="18" charset="0"/>
-              </a:rPr>
-              <a:t>GitLab</a:t>
-            </a:r>
-            <a:r>
-              <a:rPr lang="pt-BR" sz="2400" dirty="0">
-                <a:latin typeface="Times New Roman" panose="02020603050405020304" pitchFamily="18" charset="0"/>
-                <a:cs typeface="Times New Roman" panose="02020603050405020304" pitchFamily="18" charset="0"/>
-              </a:rPr>
-              <a:t>, </a:t>
-            </a:r>
-            <a:r>
-              <a:rPr lang="pt-BR" sz="2400" dirty="0" err="1">
-                <a:latin typeface="Times New Roman" panose="02020603050405020304" pitchFamily="18" charset="0"/>
-                <a:cs typeface="Times New Roman" panose="02020603050405020304" pitchFamily="18" charset="0"/>
-              </a:rPr>
-              <a:t>BitBucket</a:t>
-            </a:r>
-            <a:r>
-              <a:rPr lang="pt-BR" sz="2400">
-                <a:latin typeface="Times New Roman" panose="02020603050405020304" pitchFamily="18" charset="0"/>
-                <a:cs typeface="Times New Roman" panose="02020603050405020304" pitchFamily="18" charset="0"/>
-              </a:rPr>
-              <a:t>, etc</a:t>
-            </a:r>
-            <a:r>
-              <a:rPr lang="pt-BR" sz="2400" dirty="0">
-                <a:latin typeface="Times New Roman" panose="02020603050405020304" pitchFamily="18" charset="0"/>
-                <a:cs typeface="Times New Roman" panose="02020603050405020304" pitchFamily="18" charset="0"/>
-              </a:rPr>
-              <a:t>.</a:t>
-            </a:r>
+            <a:endParaRPr lang="pt-BR" sz="2000" dirty="0">
+              <a:latin typeface="Times New Roman" panose="02020603050405020304" pitchFamily="18" charset="0"/>
+              <a:cs typeface="Times New Roman" panose="02020603050405020304" pitchFamily="18" charset="0"/>
+            </a:endParaRPr>
           </a:p>
           <a:p>
             <a:pPr algn="just">
               <a:buFont typeface="Wingdings" panose="05000000000000000000" pitchFamily="2" charset="2"/>
               <a:buChar char="ü"/>
             </a:pPr>
-            <a:endParaRPr lang="pt-BR" sz="2400" dirty="0">
-              <a:latin typeface="Times New Roman" panose="02020603050405020304" pitchFamily="18" charset="0"/>
-              <a:cs typeface="Times New Roman" panose="02020603050405020304" pitchFamily="18" charset="0"/>
-            </a:endParaRPr>
+            <a:r>
+              <a:rPr lang="pt-BR" sz="2000" b="1" dirty="0">
+                <a:solidFill>
+                  <a:srgbClr val="FF0000"/>
+                </a:solidFill>
+                <a:latin typeface="Times New Roman" panose="02020603050405020304" pitchFamily="18" charset="0"/>
+                <a:cs typeface="Times New Roman" panose="02020603050405020304" pitchFamily="18" charset="0"/>
+              </a:rPr>
+              <a:t>Repositório de Dados Remoto</a:t>
+            </a:r>
+            <a:r>
+              <a:rPr lang="pt-BR" sz="2000" dirty="0">
+                <a:latin typeface="Times New Roman" panose="02020603050405020304" pitchFamily="18" charset="0"/>
+                <a:cs typeface="Times New Roman" panose="02020603050405020304" pitchFamily="18" charset="0"/>
+              </a:rPr>
+              <a:t>: </a:t>
+            </a:r>
+            <a:r>
+              <a:rPr lang="pt-BR" sz="2000" b="1" dirty="0">
+                <a:solidFill>
+                  <a:srgbClr val="0070C0"/>
+                </a:solidFill>
+                <a:latin typeface="Times New Roman" panose="02020603050405020304" pitchFamily="18" charset="0"/>
+                <a:cs typeface="Times New Roman" panose="02020603050405020304" pitchFamily="18" charset="0"/>
+              </a:rPr>
+              <a:t>GitHub</a:t>
+            </a:r>
+            <a:r>
+              <a:rPr lang="pt-BR" sz="2000" dirty="0">
+                <a:latin typeface="Times New Roman" panose="02020603050405020304" pitchFamily="18" charset="0"/>
+                <a:cs typeface="Times New Roman" panose="02020603050405020304" pitchFamily="18" charset="0"/>
+              </a:rPr>
+              <a:t>, </a:t>
+            </a:r>
+            <a:r>
+              <a:rPr lang="pt-BR" sz="2000" dirty="0" err="1">
+                <a:latin typeface="Times New Roman" panose="02020603050405020304" pitchFamily="18" charset="0"/>
+                <a:cs typeface="Times New Roman" panose="02020603050405020304" pitchFamily="18" charset="0"/>
+              </a:rPr>
+              <a:t>GitLab</a:t>
+            </a:r>
+            <a:r>
+              <a:rPr lang="pt-BR" sz="2000" dirty="0">
+                <a:latin typeface="Times New Roman" panose="02020603050405020304" pitchFamily="18" charset="0"/>
+                <a:cs typeface="Times New Roman" panose="02020603050405020304" pitchFamily="18" charset="0"/>
+              </a:rPr>
+              <a:t>, </a:t>
+            </a:r>
+            <a:r>
+              <a:rPr lang="pt-BR" sz="2000" dirty="0" err="1">
+                <a:latin typeface="Times New Roman" panose="02020603050405020304" pitchFamily="18" charset="0"/>
+                <a:cs typeface="Times New Roman" panose="02020603050405020304" pitchFamily="18" charset="0"/>
+              </a:rPr>
+              <a:t>BitBucket</a:t>
+            </a:r>
+            <a:r>
+              <a:rPr lang="pt-BR" sz="2000" dirty="0">
+                <a:latin typeface="Times New Roman" panose="02020603050405020304" pitchFamily="18" charset="0"/>
+                <a:cs typeface="Times New Roman" panose="02020603050405020304" pitchFamily="18" charset="0"/>
+              </a:rPr>
+              <a:t>, etc.</a:t>
+            </a:r>
           </a:p>
           <a:p>
             <a:pPr algn="just">
               <a:buFont typeface="Wingdings" panose="05000000000000000000" pitchFamily="2" charset="2"/>
               <a:buChar char="ü"/>
             </a:pPr>
-            <a:r>
-              <a:rPr lang="pt-BR" sz="2400" b="1" dirty="0">
+            <a:endParaRPr lang="pt-BR" sz="2000" dirty="0">
+              <a:latin typeface="Times New Roman" panose="02020603050405020304" pitchFamily="18" charset="0"/>
+              <a:cs typeface="Times New Roman" panose="02020603050405020304" pitchFamily="18" charset="0"/>
+            </a:endParaRPr>
+          </a:p>
+          <a:p>
+            <a:pPr algn="just">
+              <a:buFont typeface="Wingdings" panose="05000000000000000000" pitchFamily="2" charset="2"/>
+              <a:buChar char="ü"/>
+            </a:pPr>
+            <a:r>
+              <a:rPr lang="pt-BR" sz="2000" b="1" dirty="0">
                 <a:solidFill>
                   <a:srgbClr val="FF0000"/>
                 </a:solidFill>
@@ -9647,14 +10374,14 @@
               <a:t>Sistema de Controle de Versão</a:t>
             </a:r>
             <a:r>
-              <a:rPr lang="pt-BR" sz="2400" dirty="0">
+              <a:rPr lang="pt-BR" sz="2000" dirty="0">
                 <a:latin typeface="Times New Roman" panose="02020603050405020304" pitchFamily="18" charset="0"/>
                 <a:cs typeface="Times New Roman" panose="02020603050405020304" pitchFamily="18" charset="0"/>
               </a:rPr>
               <a:t>: </a:t>
             </a:r>
             <a:r>
-              <a:rPr lang="pt-BR" sz="2400" b="1" dirty="0" err="1">
+              <a:rPr lang="pt-BR" sz="2000" b="1" dirty="0" err="1">
                 <a:solidFill>
                   <a:srgbClr val="0070C0"/>
                 </a:solidFill>
@@ -9664,14 +10391,14 @@
               <a:t>Cmder</a:t>
             </a:r>
             <a:r>
-              <a:rPr lang="pt-BR" sz="2400" dirty="0">
+              <a:rPr lang="pt-BR" sz="2000" dirty="0">
                 <a:latin typeface="Times New Roman" panose="02020603050405020304" pitchFamily="18" charset="0"/>
                 <a:cs typeface="Times New Roman" panose="02020603050405020304" pitchFamily="18" charset="0"/>
               </a:rPr>
               <a:t>, </a:t>
             </a:r>
             <a:r>
-              <a:rPr lang="pt-BR" sz="2400" b="1" dirty="0" err="1">
+              <a:rPr lang="pt-BR" sz="2000" b="1" dirty="0" err="1">
                 <a:solidFill>
                   <a:srgbClr val="FF0000"/>
                 </a:solidFill>
@@ -9681,7 +10408,7 @@
               <a:t>Git</a:t>
             </a:r>
             <a:r>
-              <a:rPr lang="pt-BR" sz="2400" dirty="0">
+              <a:rPr lang="pt-BR" sz="2000" dirty="0">
                 <a:latin typeface="Times New Roman" panose="02020603050405020304" pitchFamily="18" charset="0"/>
                 <a:cs typeface="Times New Roman" panose="02020603050405020304" pitchFamily="18" charset="0"/>
               </a:rPr>

</xml_diff>

<commit_message>
atualização slides aula 01, 02 24Ago2023
</commit_message>
<xml_diff>
--- a/01 Classes/Aula 01 Desenvolvimento Web PHP Caracterização.pptx
+++ b/01 Classes/Aula 01 Desenvolvimento Web PHP Caracterização.pptx
@@ -7274,6 +7274,33 @@
             </a:pPr>
             <a:r>
               <a:rPr lang="pt-BR" sz="2000" b="1" dirty="0">
+                <a:solidFill>
+                  <a:srgbClr val="FF0000"/>
+                </a:solidFill>
+                <a:latin typeface="Times New Roman" panose="02020603050405020304" pitchFamily="18" charset="0"/>
+                <a:cs typeface="Times New Roman" panose="02020603050405020304" pitchFamily="18" charset="0"/>
+              </a:rPr>
+              <a:t> 		</a:t>
+            </a:r>
+            <a:r>
+              <a:rPr lang="pt-BR" sz="2000" dirty="0">
+                <a:latin typeface="Times New Roman" panose="02020603050405020304" pitchFamily="18" charset="0"/>
+                <a:cs typeface="Times New Roman" panose="02020603050405020304" pitchFamily="18" charset="0"/>
+                <a:hlinkClick r:id="rId3"/>
+              </a:rPr>
+              <a:t>https://code.visualstudio.com/download</a:t>
+            </a:r>
+            <a:endParaRPr lang="pt-BR" sz="2000" dirty="0">
+              <a:latin typeface="Times New Roman" panose="02020603050405020304" pitchFamily="18" charset="0"/>
+              <a:cs typeface="Times New Roman" panose="02020603050405020304" pitchFamily="18" charset="0"/>
+            </a:endParaRPr>
+          </a:p>
+          <a:p>
+            <a:pPr marL="0" indent="0" algn="just">
+              <a:buNone/>
+            </a:pPr>
+            <a:r>
+              <a:rPr lang="pt-BR" sz="2000" b="1" dirty="0">
                 <a:latin typeface="Times New Roman" panose="02020603050405020304" pitchFamily="18" charset="0"/>
                 <a:cs typeface="Times New Roman" panose="02020603050405020304" pitchFamily="18" charset="0"/>
               </a:rPr>
@@ -7290,7 +7317,7 @@
               <a:rPr lang="pt-BR" sz="2000" dirty="0">
                 <a:latin typeface="Times New Roman" panose="02020603050405020304" pitchFamily="18" charset="0"/>
                 <a:cs typeface="Times New Roman" panose="02020603050405020304" pitchFamily="18" charset="0"/>
-                <a:hlinkClick r:id="rId3"/>
+                <a:hlinkClick r:id="rId4"/>
               </a:rPr>
               <a:t>https://www.onlinegdb.com/</a:t>
             </a:r>
@@ -7645,18 +7672,6 @@
             </a:r>
           </a:p>
           <a:p>
-            <a:pPr marL="514350" indent="-514350" algn="just">
-              <a:buAutoNum type="arabicPeriod"/>
-            </a:pPr>
-            <a:endParaRPr lang="pt-BR" sz="2000" b="1" dirty="0">
-              <a:solidFill>
-                <a:srgbClr val="FF0000"/>
-              </a:solidFill>
-              <a:latin typeface="Times New Roman" panose="02020603050405020304" pitchFamily="18" charset="0"/>
-              <a:cs typeface="Times New Roman" panose="02020603050405020304" pitchFamily="18" charset="0"/>
-            </a:endParaRPr>
-          </a:p>
-          <a:p>
             <a:pPr marL="0" indent="0" algn="just">
               <a:buNone/>
             </a:pPr>
@@ -7702,18 +7717,6 @@
               </a:rPr>
               <a:t>(servidor web).</a:t>
             </a:r>
-          </a:p>
-          <a:p>
-            <a:pPr marL="0" indent="0" algn="just">
-              <a:buNone/>
-            </a:pPr>
-            <a:endParaRPr lang="pt-BR" sz="2000" b="1" dirty="0">
-              <a:solidFill>
-                <a:srgbClr val="FF0000"/>
-              </a:solidFill>
-              <a:latin typeface="Times New Roman" panose="02020603050405020304" pitchFamily="18" charset="0"/>
-              <a:cs typeface="Times New Roman" panose="02020603050405020304" pitchFamily="18" charset="0"/>
-            </a:endParaRPr>
           </a:p>
         </p:txBody>
       </p:sp>
@@ -10194,16 +10197,6 @@
               <a:buFont typeface="Wingdings" panose="05000000000000000000" pitchFamily="2" charset="2"/>
               <a:buChar char="ü"/>
             </a:pPr>
-            <a:endParaRPr lang="pt-BR" sz="2000" dirty="0">
-              <a:latin typeface="Times New Roman" panose="02020603050405020304" pitchFamily="18" charset="0"/>
-              <a:cs typeface="Times New Roman" panose="02020603050405020304" pitchFamily="18" charset="0"/>
-            </a:endParaRPr>
-          </a:p>
-          <a:p>
-            <a:pPr algn="just">
-              <a:buFont typeface="Wingdings" panose="05000000000000000000" pitchFamily="2" charset="2"/>
-              <a:buChar char="ü"/>
-            </a:pPr>
             <a:r>
               <a:rPr lang="pt-BR" sz="2000" b="1" dirty="0">
                 <a:solidFill>
@@ -10353,6 +10346,63 @@
               <a:buFont typeface="Wingdings" panose="05000000000000000000" pitchFamily="2" charset="2"/>
               <a:buChar char="ü"/>
             </a:pPr>
+            <a:r>
+              <a:rPr lang="pt-BR" sz="2000" b="1" dirty="0">
+                <a:solidFill>
+                  <a:srgbClr val="FF0000"/>
+                </a:solidFill>
+                <a:latin typeface="Times New Roman" panose="02020603050405020304" pitchFamily="18" charset="0"/>
+                <a:cs typeface="Times New Roman" panose="02020603050405020304" pitchFamily="18" charset="0"/>
+              </a:rPr>
+              <a:t>Sistema de Controle de Versão</a:t>
+            </a:r>
+            <a:r>
+              <a:rPr lang="pt-BR" sz="2000" dirty="0">
+                <a:latin typeface="Times New Roman" panose="02020603050405020304" pitchFamily="18" charset="0"/>
+                <a:cs typeface="Times New Roman" panose="02020603050405020304" pitchFamily="18" charset="0"/>
+              </a:rPr>
+              <a:t>: </a:t>
+            </a:r>
+            <a:r>
+              <a:rPr lang="pt-BR" sz="2000" b="1" dirty="0" err="1">
+                <a:solidFill>
+                  <a:srgbClr val="0070C0"/>
+                </a:solidFill>
+                <a:latin typeface="Times New Roman" panose="02020603050405020304" pitchFamily="18" charset="0"/>
+                <a:cs typeface="Times New Roman" panose="02020603050405020304" pitchFamily="18" charset="0"/>
+              </a:rPr>
+              <a:t>Cmder</a:t>
+            </a:r>
+            <a:r>
+              <a:rPr lang="pt-BR" sz="2000" dirty="0">
+                <a:latin typeface="Times New Roman" panose="02020603050405020304" pitchFamily="18" charset="0"/>
+                <a:cs typeface="Times New Roman" panose="02020603050405020304" pitchFamily="18" charset="0"/>
+              </a:rPr>
+              <a:t>, </a:t>
+            </a:r>
+            <a:r>
+              <a:rPr lang="pt-BR" sz="2000" b="1" dirty="0" err="1">
+                <a:solidFill>
+                  <a:srgbClr val="FF0000"/>
+                </a:solidFill>
+                <a:latin typeface="Times New Roman" panose="02020603050405020304" pitchFamily="18" charset="0"/>
+                <a:cs typeface="Times New Roman" panose="02020603050405020304" pitchFamily="18" charset="0"/>
+              </a:rPr>
+              <a:t>Git</a:t>
+            </a:r>
+            <a:r>
+              <a:rPr lang="pt-BR" sz="2000" dirty="0">
+                <a:latin typeface="Times New Roman" panose="02020603050405020304" pitchFamily="18" charset="0"/>
+                <a:cs typeface="Times New Roman" panose="02020603050405020304" pitchFamily="18" charset="0"/>
+              </a:rPr>
+              <a:t>, etc.</a:t>
+            </a:r>
+          </a:p>
+          <a:p>
+            <a:pPr algn="just">
+              <a:buFont typeface="Wingdings" panose="05000000000000000000" pitchFamily="2" charset="2"/>
+              <a:buChar char="ü"/>
+            </a:pPr>
             <a:endParaRPr lang="pt-BR" sz="2000" dirty="0">
               <a:latin typeface="Times New Roman" panose="02020603050405020304" pitchFamily="18" charset="0"/>
               <a:cs typeface="Times New Roman" panose="02020603050405020304" pitchFamily="18" charset="0"/>
@@ -10364,6 +10414,16 @@
               <a:buChar char="ü"/>
             </a:pPr>
             <a:r>
+              <a:rPr lang="pt-BR" sz="2000" b="1" dirty="0" err="1">
+                <a:solidFill>
+                  <a:srgbClr val="FF0000"/>
+                </a:solidFill>
+                <a:latin typeface="Times New Roman" panose="02020603050405020304" pitchFamily="18" charset="0"/>
+                <a:cs typeface="Times New Roman" panose="02020603050405020304" pitchFamily="18" charset="0"/>
+              </a:rPr>
+              <a:t>NodeJS</a:t>
+            </a:r>
+            <a:r>
               <a:rPr lang="pt-BR" sz="2000" b="1" dirty="0">
                 <a:solidFill>
                   <a:srgbClr val="FF0000"/>
@@ -10371,49 +10431,22 @@
                 <a:latin typeface="Times New Roman" panose="02020603050405020304" pitchFamily="18" charset="0"/>
                 <a:cs typeface="Times New Roman" panose="02020603050405020304" pitchFamily="18" charset="0"/>
               </a:rPr>
-              <a:t>Sistema de Controle de Versão</a:t>
-            </a:r>
-            <a:r>
-              <a:rPr lang="pt-BR" sz="2000" dirty="0">
-                <a:latin typeface="Times New Roman" panose="02020603050405020304" pitchFamily="18" charset="0"/>
-                <a:cs typeface="Times New Roman" panose="02020603050405020304" pitchFamily="18" charset="0"/>
-              </a:rPr>
-              <a:t>: </a:t>
-            </a:r>
-            <a:r>
-              <a:rPr lang="pt-BR" sz="2000" b="1" dirty="0" err="1">
+              <a:t>:</a:t>
+            </a:r>
+            <a:r>
+              <a:rPr lang="pt-BR" sz="2000" b="1" dirty="0">
                 <a:solidFill>
                   <a:srgbClr val="0070C0"/>
                 </a:solidFill>
                 <a:latin typeface="Times New Roman" panose="02020603050405020304" pitchFamily="18" charset="0"/>
                 <a:cs typeface="Times New Roman" panose="02020603050405020304" pitchFamily="18" charset="0"/>
               </a:rPr>
-              <a:t>Cmder</a:t>
-            </a:r>
-            <a:r>
-              <a:rPr lang="pt-BR" sz="2000" dirty="0">
-                <a:latin typeface="Times New Roman" panose="02020603050405020304" pitchFamily="18" charset="0"/>
-                <a:cs typeface="Times New Roman" panose="02020603050405020304" pitchFamily="18" charset="0"/>
-              </a:rPr>
-              <a:t>, </a:t>
-            </a:r>
-            <a:r>
-              <a:rPr lang="pt-BR" sz="2000" b="1" dirty="0" err="1">
-                <a:solidFill>
-                  <a:srgbClr val="FF0000"/>
-                </a:solidFill>
-                <a:latin typeface="Times New Roman" panose="02020603050405020304" pitchFamily="18" charset="0"/>
-                <a:cs typeface="Times New Roman" panose="02020603050405020304" pitchFamily="18" charset="0"/>
-              </a:rPr>
-              <a:t>Git</a:t>
-            </a:r>
-            <a:r>
-              <a:rPr lang="pt-BR" sz="2000" dirty="0">
-                <a:latin typeface="Times New Roman" panose="02020603050405020304" pitchFamily="18" charset="0"/>
-                <a:cs typeface="Times New Roman" panose="02020603050405020304" pitchFamily="18" charset="0"/>
-              </a:rPr>
-              <a:t>, etc.</a:t>
-            </a:r>
+              <a:t> Servidor Java Script</a:t>
+            </a:r>
+            <a:endParaRPr lang="pt-BR" sz="2000" dirty="0">
+              <a:latin typeface="Times New Roman" panose="02020603050405020304" pitchFamily="18" charset="0"/>
+              <a:cs typeface="Times New Roman" panose="02020603050405020304" pitchFamily="18" charset="0"/>
+            </a:endParaRPr>
           </a:p>
         </p:txBody>
       </p:sp>

</xml_diff>